<commit_message>
Refactor menu classes - A dedicated class has been created for each menu - not-implemented decorator
</commit_message>
<xml_diff>
--- a/docs/gui_design.pptx
+++ b/docs/gui_design.pptx
@@ -324,7 +324,7 @@
           <a:p>
             <a:fld id="{B3E02414-0C21-4CC3-871B-2D6AD27EF3B6}" type="datetimeFigureOut">
               <a:rPr lang="es-ES" smtClean="0"/>
-              <a:t>14/06/2020</a:t>
+              <a:t>15/06/2020</a:t>
             </a:fld>
             <a:endParaRPr lang="es-ES"/>
           </a:p>
@@ -522,7 +522,7 @@
           <a:p>
             <a:fld id="{B3E02414-0C21-4CC3-871B-2D6AD27EF3B6}" type="datetimeFigureOut">
               <a:rPr lang="es-ES" smtClean="0"/>
-              <a:t>14/06/2020</a:t>
+              <a:t>15/06/2020</a:t>
             </a:fld>
             <a:endParaRPr lang="es-ES"/>
           </a:p>
@@ -730,7 +730,7 @@
           <a:p>
             <a:fld id="{B3E02414-0C21-4CC3-871B-2D6AD27EF3B6}" type="datetimeFigureOut">
               <a:rPr lang="es-ES" smtClean="0"/>
-              <a:t>14/06/2020</a:t>
+              <a:t>15/06/2020</a:t>
             </a:fld>
             <a:endParaRPr lang="es-ES"/>
           </a:p>
@@ -928,7 +928,7 @@
           <a:p>
             <a:fld id="{B3E02414-0C21-4CC3-871B-2D6AD27EF3B6}" type="datetimeFigureOut">
               <a:rPr lang="es-ES" smtClean="0"/>
-              <a:t>14/06/2020</a:t>
+              <a:t>15/06/2020</a:t>
             </a:fld>
             <a:endParaRPr lang="es-ES"/>
           </a:p>
@@ -1203,7 +1203,7 @@
           <a:p>
             <a:fld id="{B3E02414-0C21-4CC3-871B-2D6AD27EF3B6}" type="datetimeFigureOut">
               <a:rPr lang="es-ES" smtClean="0"/>
-              <a:t>14/06/2020</a:t>
+              <a:t>15/06/2020</a:t>
             </a:fld>
             <a:endParaRPr lang="es-ES"/>
           </a:p>
@@ -1468,7 +1468,7 @@
           <a:p>
             <a:fld id="{B3E02414-0C21-4CC3-871B-2D6AD27EF3B6}" type="datetimeFigureOut">
               <a:rPr lang="es-ES" smtClean="0"/>
-              <a:t>14/06/2020</a:t>
+              <a:t>15/06/2020</a:t>
             </a:fld>
             <a:endParaRPr lang="es-ES"/>
           </a:p>
@@ -1880,7 +1880,7 @@
           <a:p>
             <a:fld id="{B3E02414-0C21-4CC3-871B-2D6AD27EF3B6}" type="datetimeFigureOut">
               <a:rPr lang="es-ES" smtClean="0"/>
-              <a:t>14/06/2020</a:t>
+              <a:t>15/06/2020</a:t>
             </a:fld>
             <a:endParaRPr lang="es-ES"/>
           </a:p>
@@ -2021,7 +2021,7 @@
           <a:p>
             <a:fld id="{B3E02414-0C21-4CC3-871B-2D6AD27EF3B6}" type="datetimeFigureOut">
               <a:rPr lang="es-ES" smtClean="0"/>
-              <a:t>14/06/2020</a:t>
+              <a:t>15/06/2020</a:t>
             </a:fld>
             <a:endParaRPr lang="es-ES"/>
           </a:p>
@@ -2134,7 +2134,7 @@
           <a:p>
             <a:fld id="{B3E02414-0C21-4CC3-871B-2D6AD27EF3B6}" type="datetimeFigureOut">
               <a:rPr lang="es-ES" smtClean="0"/>
-              <a:t>14/06/2020</a:t>
+              <a:t>15/06/2020</a:t>
             </a:fld>
             <a:endParaRPr lang="es-ES"/>
           </a:p>
@@ -2445,7 +2445,7 @@
           <a:p>
             <a:fld id="{B3E02414-0C21-4CC3-871B-2D6AD27EF3B6}" type="datetimeFigureOut">
               <a:rPr lang="es-ES" smtClean="0"/>
-              <a:t>14/06/2020</a:t>
+              <a:t>15/06/2020</a:t>
             </a:fld>
             <a:endParaRPr lang="es-ES"/>
           </a:p>
@@ -2733,7 +2733,7 @@
           <a:p>
             <a:fld id="{B3E02414-0C21-4CC3-871B-2D6AD27EF3B6}" type="datetimeFigureOut">
               <a:rPr lang="es-ES" smtClean="0"/>
-              <a:t>14/06/2020</a:t>
+              <a:t>15/06/2020</a:t>
             </a:fld>
             <a:endParaRPr lang="es-ES"/>
           </a:p>
@@ -2974,7 +2974,7 @@
           <a:p>
             <a:fld id="{B3E02414-0C21-4CC3-871B-2D6AD27EF3B6}" type="datetimeFigureOut">
               <a:rPr lang="es-ES" smtClean="0"/>
-              <a:t>14/06/2020</a:t>
+              <a:t>15/06/2020</a:t>
             </a:fld>
             <a:endParaRPr lang="es-ES"/>
           </a:p>
@@ -4023,6 +4023,14 @@
               <a:rPr lang="es-ES" dirty="0" err="1"/>
               <a:t>menu</a:t>
             </a:r>
+            <a:r>
+              <a:rPr lang="es-ES" dirty="0"/>
+              <a:t> </a:t>
+            </a:r>
+            <a:r>
+              <a:rPr lang="en-US" dirty="0"/>
+              <a:t>✔</a:t>
+            </a:r>
             <a:endParaRPr lang="es-ES" dirty="0"/>
           </a:p>
           <a:p>
@@ -4084,8 +4092,21 @@
             </a:r>
             <a:r>
               <a:rPr lang="es-ES" dirty="0"/>
-              <a:t> menú</a:t>
-            </a:r>
+              <a:t> </a:t>
+            </a:r>
+            <a:r>
+              <a:rPr lang="es-ES" dirty="0" err="1"/>
+              <a:t>menu</a:t>
+            </a:r>
+            <a:r>
+              <a:rPr lang="es-ES" dirty="0"/>
+              <a:t> </a:t>
+            </a:r>
+            <a:r>
+              <a:rPr lang="en-US" dirty="0"/>
+              <a:t>✔</a:t>
+            </a:r>
+            <a:endParaRPr lang="es-ES" dirty="0"/>
           </a:p>
           <a:p>
             <a:pPr marL="285750" indent="-285750">
@@ -4138,8 +4159,13 @@
             </a:r>
             <a:r>
               <a:rPr lang="es-ES" dirty="0"/>
-              <a:t>, test)</a:t>
-            </a:r>
+              <a:t>, test) </a:t>
+            </a:r>
+            <a:r>
+              <a:rPr lang="en-US" dirty="0"/>
+              <a:t>✔</a:t>
+            </a:r>
+            <a:endParaRPr lang="es-ES" dirty="0"/>
           </a:p>
           <a:p>
             <a:pPr marL="285750" indent="-285750">
@@ -4264,12 +4290,419 @@
           </p:txBody>
         </p:sp>
       </p:grpSp>
+      <p:sp>
+        <p:nvSpPr>
+          <p:cNvPr id="2" name="CuadroTexto 1">
+            <a:extLst>
+              <a:ext uri="{FF2B5EF4-FFF2-40B4-BE49-F238E27FC236}">
+                <a16:creationId xmlns:a16="http://schemas.microsoft.com/office/drawing/2014/main" id="{13EBE1A3-05B8-4CBB-94EE-98EFCC3BCE00}"/>
+              </a:ext>
+            </a:extLst>
+          </p:cNvPr>
+          <p:cNvSpPr txBox="1"/>
+          <p:nvPr/>
+        </p:nvSpPr>
+        <p:spPr>
+          <a:xfrm>
+            <a:off x="8516025" y="2635002"/>
+            <a:ext cx="2201663" cy="923330"/>
+          </a:xfrm>
+          <a:prstGeom prst="rect">
+            <a:avLst/>
+          </a:prstGeom>
+          <a:noFill/>
+          <a:ln w="6350">
+            <a:solidFill>
+              <a:schemeClr val="tx1"/>
+            </a:solidFill>
+          </a:ln>
+        </p:spPr>
+        <p:txBody>
+          <a:bodyPr wrap="square" rtlCol="0">
+            <a:spAutoFit/>
+          </a:bodyPr>
+          <a:lstStyle/>
+          <a:p>
+            <a:r>
+              <a:rPr lang="es-ES" dirty="0"/>
+              <a:t>Total </a:t>
+            </a:r>
+            <a:r>
+              <a:rPr lang="es-ES" dirty="0" err="1"/>
+              <a:t>distance</a:t>
+            </a:r>
+            <a:endParaRPr lang="es-ES" dirty="0"/>
+          </a:p>
+          <a:p>
+            <a:r>
+              <a:rPr lang="es-ES" dirty="0" err="1"/>
+              <a:t>Uphill</a:t>
+            </a:r>
+            <a:r>
+              <a:rPr lang="es-ES" dirty="0"/>
+              <a:t> </a:t>
+            </a:r>
+            <a:r>
+              <a:rPr lang="es-ES" dirty="0" err="1"/>
+              <a:t>elevation</a:t>
+            </a:r>
+            <a:endParaRPr lang="es-ES" dirty="0"/>
+          </a:p>
+          <a:p>
+            <a:r>
+              <a:rPr lang="es-ES" dirty="0" err="1"/>
+              <a:t>Downhill</a:t>
+            </a:r>
+            <a:r>
+              <a:rPr lang="es-ES" dirty="0"/>
+              <a:t> </a:t>
+            </a:r>
+            <a:r>
+              <a:rPr lang="es-ES" dirty="0" err="1"/>
+              <a:t>elevation</a:t>
+            </a:r>
+            <a:endParaRPr lang="es-ES" dirty="0"/>
+          </a:p>
+        </p:txBody>
+      </p:sp>
+      <p:sp>
+        <p:nvSpPr>
+          <p:cNvPr id="19" name="CuadroTexto 18">
+            <a:extLst>
+              <a:ext uri="{FF2B5EF4-FFF2-40B4-BE49-F238E27FC236}">
+                <a16:creationId xmlns:a16="http://schemas.microsoft.com/office/drawing/2014/main" id="{D6388275-7A37-4C1C-AEE0-BCB3DB9E4552}"/>
+              </a:ext>
+            </a:extLst>
+          </p:cNvPr>
+          <p:cNvSpPr txBox="1"/>
+          <p:nvPr/>
+        </p:nvSpPr>
+        <p:spPr>
+          <a:xfrm>
+            <a:off x="1623235" y="617377"/>
+            <a:ext cx="964734" cy="369332"/>
+          </a:xfrm>
+          <a:prstGeom prst="rect">
+            <a:avLst/>
+          </a:prstGeom>
+          <a:solidFill>
+            <a:schemeClr val="bg1">
+              <a:lumMod val="75000"/>
+            </a:schemeClr>
+          </a:solidFill>
+          <a:ln>
+            <a:solidFill>
+              <a:schemeClr val="tx1"/>
+            </a:solidFill>
+          </a:ln>
+        </p:spPr>
+        <p:txBody>
+          <a:bodyPr wrap="square" rtlCol="0">
+            <a:spAutoFit/>
+          </a:bodyPr>
+          <a:lstStyle/>
+          <a:p>
+            <a:r>
+              <a:rPr lang="es-ES" dirty="0" err="1"/>
+              <a:t>Edit</a:t>
+            </a:r>
+            <a:endParaRPr lang="es-ES" dirty="0"/>
+          </a:p>
+        </p:txBody>
+      </p:sp>
+      <p:sp>
+        <p:nvSpPr>
+          <p:cNvPr id="20" name="CuadroTexto 19">
+            <a:extLst>
+              <a:ext uri="{FF2B5EF4-FFF2-40B4-BE49-F238E27FC236}">
+                <a16:creationId xmlns:a16="http://schemas.microsoft.com/office/drawing/2014/main" id="{0C264CB2-A6FA-4E6B-AE91-CFBA18F78ADA}"/>
+              </a:ext>
+            </a:extLst>
+          </p:cNvPr>
+          <p:cNvSpPr txBox="1"/>
+          <p:nvPr/>
+        </p:nvSpPr>
+        <p:spPr>
+          <a:xfrm>
+            <a:off x="1774235" y="986709"/>
+            <a:ext cx="1325461" cy="307777"/>
+          </a:xfrm>
+          <a:prstGeom prst="rect">
+            <a:avLst/>
+          </a:prstGeom>
+          <a:solidFill>
+            <a:schemeClr val="bg1">
+              <a:lumMod val="75000"/>
+            </a:schemeClr>
+          </a:solidFill>
+          <a:ln>
+            <a:solidFill>
+              <a:schemeClr val="tx1"/>
+            </a:solidFill>
+          </a:ln>
+        </p:spPr>
+        <p:txBody>
+          <a:bodyPr wrap="square" rtlCol="0">
+            <a:spAutoFit/>
+          </a:bodyPr>
+          <a:lstStyle/>
+          <a:p>
+            <a:r>
+              <a:rPr lang="es-ES" sz="1400" dirty="0" err="1"/>
+              <a:t>Cut</a:t>
+            </a:r>
+            <a:endParaRPr lang="es-ES" sz="1400" dirty="0"/>
+          </a:p>
+        </p:txBody>
+      </p:sp>
+      <p:sp>
+        <p:nvSpPr>
+          <p:cNvPr id="21" name="CuadroTexto 20">
+            <a:extLst>
+              <a:ext uri="{FF2B5EF4-FFF2-40B4-BE49-F238E27FC236}">
+                <a16:creationId xmlns:a16="http://schemas.microsoft.com/office/drawing/2014/main" id="{F8151BB7-52B9-4035-A738-BD140D5D48F6}"/>
+              </a:ext>
+            </a:extLst>
+          </p:cNvPr>
+          <p:cNvSpPr txBox="1"/>
+          <p:nvPr/>
+        </p:nvSpPr>
+        <p:spPr>
+          <a:xfrm>
+            <a:off x="1774234" y="1294486"/>
+            <a:ext cx="1325461" cy="307777"/>
+          </a:xfrm>
+          <a:prstGeom prst="rect">
+            <a:avLst/>
+          </a:prstGeom>
+          <a:solidFill>
+            <a:schemeClr val="bg1">
+              <a:lumMod val="75000"/>
+            </a:schemeClr>
+          </a:solidFill>
+          <a:ln>
+            <a:solidFill>
+              <a:schemeClr val="tx1"/>
+            </a:solidFill>
+          </a:ln>
+        </p:spPr>
+        <p:txBody>
+          <a:bodyPr wrap="square" rtlCol="0">
+            <a:spAutoFit/>
+          </a:bodyPr>
+          <a:lstStyle/>
+          <a:p>
+            <a:r>
+              <a:rPr lang="es-ES" sz="1400" dirty="0"/>
+              <a:t>Reverse</a:t>
+            </a:r>
+          </a:p>
+        </p:txBody>
+      </p:sp>
+      <p:sp>
+        <p:nvSpPr>
+          <p:cNvPr id="22" name="CuadroTexto 21">
+            <a:extLst>
+              <a:ext uri="{FF2B5EF4-FFF2-40B4-BE49-F238E27FC236}">
+                <a16:creationId xmlns:a16="http://schemas.microsoft.com/office/drawing/2014/main" id="{46F10B72-267E-4BFB-B14E-69572CFA8C21}"/>
+              </a:ext>
+            </a:extLst>
+          </p:cNvPr>
+          <p:cNvSpPr txBox="1"/>
+          <p:nvPr/>
+        </p:nvSpPr>
+        <p:spPr>
+          <a:xfrm>
+            <a:off x="1774234" y="1586903"/>
+            <a:ext cx="1325461" cy="307777"/>
+          </a:xfrm>
+          <a:prstGeom prst="rect">
+            <a:avLst/>
+          </a:prstGeom>
+          <a:solidFill>
+            <a:schemeClr val="bg1">
+              <a:lumMod val="75000"/>
+            </a:schemeClr>
+          </a:solidFill>
+          <a:ln>
+            <a:solidFill>
+              <a:schemeClr val="tx1"/>
+            </a:solidFill>
+          </a:ln>
+        </p:spPr>
+        <p:txBody>
+          <a:bodyPr wrap="square" rtlCol="0">
+            <a:spAutoFit/>
+          </a:bodyPr>
+          <a:lstStyle/>
+          <a:p>
+            <a:r>
+              <a:rPr lang="es-ES" sz="1400" dirty="0" err="1"/>
+              <a:t>Insert</a:t>
+            </a:r>
+            <a:r>
+              <a:rPr lang="es-ES" sz="1400" dirty="0"/>
+              <a:t> time</a:t>
+            </a:r>
+          </a:p>
+        </p:txBody>
+      </p:sp>
+      <p:sp>
+        <p:nvSpPr>
+          <p:cNvPr id="23" name="CuadroTexto 22">
+            <a:extLst>
+              <a:ext uri="{FF2B5EF4-FFF2-40B4-BE49-F238E27FC236}">
+                <a16:creationId xmlns:a16="http://schemas.microsoft.com/office/drawing/2014/main" id="{EAEA99F1-4674-46B3-9798-FADF21C40105}"/>
+              </a:ext>
+            </a:extLst>
+          </p:cNvPr>
+          <p:cNvSpPr txBox="1"/>
+          <p:nvPr/>
+        </p:nvSpPr>
+        <p:spPr>
+          <a:xfrm>
+            <a:off x="1774234" y="1897260"/>
+            <a:ext cx="1433568" cy="307777"/>
+          </a:xfrm>
+          <a:prstGeom prst="rect">
+            <a:avLst/>
+          </a:prstGeom>
+          <a:solidFill>
+            <a:schemeClr val="bg1">
+              <a:lumMod val="75000"/>
+            </a:schemeClr>
+          </a:solidFill>
+          <a:ln>
+            <a:solidFill>
+              <a:schemeClr val="tx1"/>
+            </a:solidFill>
+          </a:ln>
+        </p:spPr>
+        <p:txBody>
+          <a:bodyPr wrap="square" rtlCol="0">
+            <a:spAutoFit/>
+          </a:bodyPr>
+          <a:lstStyle/>
+          <a:p>
+            <a:r>
+              <a:rPr lang="es-ES" sz="1400" dirty="0" err="1"/>
+              <a:t>Correct</a:t>
+            </a:r>
+            <a:r>
+              <a:rPr lang="es-ES" sz="1400" dirty="0"/>
+              <a:t> </a:t>
+            </a:r>
+            <a:r>
+              <a:rPr lang="es-ES" sz="1400" dirty="0" err="1"/>
+              <a:t>elevation</a:t>
+            </a:r>
+            <a:endParaRPr lang="es-ES" sz="1400" dirty="0"/>
+          </a:p>
+        </p:txBody>
+      </p:sp>
+      <p:sp>
+        <p:nvSpPr>
+          <p:cNvPr id="24" name="CuadroTexto 23">
+            <a:extLst>
+              <a:ext uri="{FF2B5EF4-FFF2-40B4-BE49-F238E27FC236}">
+                <a16:creationId xmlns:a16="http://schemas.microsoft.com/office/drawing/2014/main" id="{8ADFD561-D90E-4185-8F9E-2A01AB69B558}"/>
+              </a:ext>
+            </a:extLst>
+          </p:cNvPr>
+          <p:cNvSpPr txBox="1"/>
+          <p:nvPr/>
+        </p:nvSpPr>
+        <p:spPr>
+          <a:xfrm>
+            <a:off x="1774233" y="2205037"/>
+            <a:ext cx="1325461" cy="307777"/>
+          </a:xfrm>
+          <a:prstGeom prst="rect">
+            <a:avLst/>
+          </a:prstGeom>
+          <a:solidFill>
+            <a:schemeClr val="bg1">
+              <a:lumMod val="75000"/>
+            </a:schemeClr>
+          </a:solidFill>
+          <a:ln>
+            <a:solidFill>
+              <a:schemeClr val="tx1"/>
+            </a:solidFill>
+          </a:ln>
+        </p:spPr>
+        <p:txBody>
+          <a:bodyPr wrap="square" rtlCol="0">
+            <a:spAutoFit/>
+          </a:bodyPr>
+          <a:lstStyle/>
+          <a:p>
+            <a:r>
+              <a:rPr lang="es-ES" sz="1400" dirty="0"/>
+              <a:t>Split</a:t>
+            </a:r>
+          </a:p>
+        </p:txBody>
+      </p:sp>
+      <p:sp>
+        <p:nvSpPr>
+          <p:cNvPr id="26" name="CuadroTexto 25">
+            <a:extLst>
+              <a:ext uri="{FF2B5EF4-FFF2-40B4-BE49-F238E27FC236}">
+                <a16:creationId xmlns:a16="http://schemas.microsoft.com/office/drawing/2014/main" id="{A0084574-BA24-4B78-AB48-EF00E1F0B4C8}"/>
+              </a:ext>
+            </a:extLst>
+          </p:cNvPr>
+          <p:cNvSpPr txBox="1"/>
+          <p:nvPr/>
+        </p:nvSpPr>
+        <p:spPr>
+          <a:xfrm>
+            <a:off x="253954" y="2184564"/>
+            <a:ext cx="1325461" cy="307777"/>
+          </a:xfrm>
+          <a:prstGeom prst="rect">
+            <a:avLst/>
+          </a:prstGeom>
+          <a:solidFill>
+            <a:schemeClr val="bg1">
+              <a:lumMod val="75000"/>
+            </a:schemeClr>
+          </a:solidFill>
+          <a:ln>
+            <a:solidFill>
+              <a:schemeClr val="tx1"/>
+            </a:solidFill>
+          </a:ln>
+        </p:spPr>
+        <p:txBody>
+          <a:bodyPr wrap="square" rtlCol="0">
+            <a:spAutoFit/>
+          </a:bodyPr>
+          <a:lstStyle/>
+          <a:p>
+            <a:r>
+              <a:rPr lang="es-ES" sz="1400" dirty="0" err="1"/>
+              <a:t>Save</a:t>
+            </a:r>
+            <a:r>
+              <a:rPr lang="es-ES" sz="1400" dirty="0"/>
+              <a:t> </a:t>
+            </a:r>
+            <a:r>
+              <a:rPr lang="es-ES" sz="1400" dirty="0" err="1"/>
+              <a:t>gpx</a:t>
+            </a:r>
+            <a:endParaRPr lang="es-ES" sz="1400" dirty="0"/>
+          </a:p>
+        </p:txBody>
+      </p:sp>
       <p:pic>
         <p:nvPicPr>
-          <p:cNvPr id="15" name="Picture 2" descr="Rendered Image">
-            <a:extLst>
-              <a:ext uri="{FF2B5EF4-FFF2-40B4-BE49-F238E27FC236}">
-                <a16:creationId xmlns:a16="http://schemas.microsoft.com/office/drawing/2014/main" id="{7B2E289B-43CF-4B37-97C5-425FBF055A8C}"/>
+          <p:cNvPr id="25" name="Picture 2" descr="Rendered Image">
+            <a:extLst>
+              <a:ext uri="{FF2B5EF4-FFF2-40B4-BE49-F238E27FC236}">
+                <a16:creationId xmlns:a16="http://schemas.microsoft.com/office/drawing/2014/main" id="{24FE2DBB-FE78-45EB-82C7-785BB7CE1BCF}"/>
               </a:ext>
             </a:extLst>
           </p:cNvPr>
@@ -4293,8 +4726,8 @@
         </p:blipFill>
         <p:spPr bwMode="auto">
           <a:xfrm>
-            <a:off x="324331" y="5331161"/>
-            <a:ext cx="2181225" cy="809625"/>
+            <a:off x="598240" y="5134504"/>
+            <a:ext cx="2019300" cy="1057275"/>
           </a:xfrm>
           <a:prstGeom prst="rect">
             <a:avLst/>
@@ -4311,413 +4744,6 @@
           </a:extLst>
         </p:spPr>
       </p:pic>
-      <p:sp>
-        <p:nvSpPr>
-          <p:cNvPr id="2" name="CuadroTexto 1">
-            <a:extLst>
-              <a:ext uri="{FF2B5EF4-FFF2-40B4-BE49-F238E27FC236}">
-                <a16:creationId xmlns:a16="http://schemas.microsoft.com/office/drawing/2014/main" id="{13EBE1A3-05B8-4CBB-94EE-98EFCC3BCE00}"/>
-              </a:ext>
-            </a:extLst>
-          </p:cNvPr>
-          <p:cNvSpPr txBox="1"/>
-          <p:nvPr/>
-        </p:nvSpPr>
-        <p:spPr>
-          <a:xfrm>
-            <a:off x="8516025" y="2635002"/>
-            <a:ext cx="2201663" cy="923330"/>
-          </a:xfrm>
-          <a:prstGeom prst="rect">
-            <a:avLst/>
-          </a:prstGeom>
-          <a:noFill/>
-          <a:ln w="6350">
-            <a:solidFill>
-              <a:schemeClr val="tx1"/>
-            </a:solidFill>
-          </a:ln>
-        </p:spPr>
-        <p:txBody>
-          <a:bodyPr wrap="square" rtlCol="0">
-            <a:spAutoFit/>
-          </a:bodyPr>
-          <a:lstStyle/>
-          <a:p>
-            <a:r>
-              <a:rPr lang="es-ES" dirty="0"/>
-              <a:t>Total </a:t>
-            </a:r>
-            <a:r>
-              <a:rPr lang="es-ES" dirty="0" err="1"/>
-              <a:t>distance</a:t>
-            </a:r>
-            <a:endParaRPr lang="es-ES" dirty="0"/>
-          </a:p>
-          <a:p>
-            <a:r>
-              <a:rPr lang="es-ES" dirty="0" err="1"/>
-              <a:t>Uphill</a:t>
-            </a:r>
-            <a:r>
-              <a:rPr lang="es-ES" dirty="0"/>
-              <a:t> </a:t>
-            </a:r>
-            <a:r>
-              <a:rPr lang="es-ES" dirty="0" err="1"/>
-              <a:t>elevation</a:t>
-            </a:r>
-            <a:endParaRPr lang="es-ES" dirty="0"/>
-          </a:p>
-          <a:p>
-            <a:r>
-              <a:rPr lang="es-ES" dirty="0" err="1"/>
-              <a:t>Downhill</a:t>
-            </a:r>
-            <a:r>
-              <a:rPr lang="es-ES" dirty="0"/>
-              <a:t> </a:t>
-            </a:r>
-            <a:r>
-              <a:rPr lang="es-ES" dirty="0" err="1"/>
-              <a:t>elevation</a:t>
-            </a:r>
-            <a:endParaRPr lang="es-ES" dirty="0"/>
-          </a:p>
-        </p:txBody>
-      </p:sp>
-      <p:sp>
-        <p:nvSpPr>
-          <p:cNvPr id="19" name="CuadroTexto 18">
-            <a:extLst>
-              <a:ext uri="{FF2B5EF4-FFF2-40B4-BE49-F238E27FC236}">
-                <a16:creationId xmlns:a16="http://schemas.microsoft.com/office/drawing/2014/main" id="{D6388275-7A37-4C1C-AEE0-BCB3DB9E4552}"/>
-              </a:ext>
-            </a:extLst>
-          </p:cNvPr>
-          <p:cNvSpPr txBox="1"/>
-          <p:nvPr/>
-        </p:nvSpPr>
-        <p:spPr>
-          <a:xfrm>
-            <a:off x="1623235" y="617377"/>
-            <a:ext cx="964734" cy="369332"/>
-          </a:xfrm>
-          <a:prstGeom prst="rect">
-            <a:avLst/>
-          </a:prstGeom>
-          <a:solidFill>
-            <a:schemeClr val="bg1">
-              <a:lumMod val="75000"/>
-            </a:schemeClr>
-          </a:solidFill>
-          <a:ln>
-            <a:solidFill>
-              <a:schemeClr val="tx1"/>
-            </a:solidFill>
-          </a:ln>
-        </p:spPr>
-        <p:txBody>
-          <a:bodyPr wrap="square" rtlCol="0">
-            <a:spAutoFit/>
-          </a:bodyPr>
-          <a:lstStyle/>
-          <a:p>
-            <a:r>
-              <a:rPr lang="es-ES" dirty="0" err="1"/>
-              <a:t>Edit</a:t>
-            </a:r>
-            <a:endParaRPr lang="es-ES" dirty="0"/>
-          </a:p>
-        </p:txBody>
-      </p:sp>
-      <p:sp>
-        <p:nvSpPr>
-          <p:cNvPr id="20" name="CuadroTexto 19">
-            <a:extLst>
-              <a:ext uri="{FF2B5EF4-FFF2-40B4-BE49-F238E27FC236}">
-                <a16:creationId xmlns:a16="http://schemas.microsoft.com/office/drawing/2014/main" id="{0C264CB2-A6FA-4E6B-AE91-CFBA18F78ADA}"/>
-              </a:ext>
-            </a:extLst>
-          </p:cNvPr>
-          <p:cNvSpPr txBox="1"/>
-          <p:nvPr/>
-        </p:nvSpPr>
-        <p:spPr>
-          <a:xfrm>
-            <a:off x="1774235" y="986709"/>
-            <a:ext cx="1325461" cy="307777"/>
-          </a:xfrm>
-          <a:prstGeom prst="rect">
-            <a:avLst/>
-          </a:prstGeom>
-          <a:solidFill>
-            <a:schemeClr val="bg1">
-              <a:lumMod val="75000"/>
-            </a:schemeClr>
-          </a:solidFill>
-          <a:ln>
-            <a:solidFill>
-              <a:schemeClr val="tx1"/>
-            </a:solidFill>
-          </a:ln>
-        </p:spPr>
-        <p:txBody>
-          <a:bodyPr wrap="square" rtlCol="0">
-            <a:spAutoFit/>
-          </a:bodyPr>
-          <a:lstStyle/>
-          <a:p>
-            <a:r>
-              <a:rPr lang="es-ES" sz="1400" dirty="0" err="1"/>
-              <a:t>Cut</a:t>
-            </a:r>
-            <a:endParaRPr lang="es-ES" sz="1400" dirty="0"/>
-          </a:p>
-        </p:txBody>
-      </p:sp>
-      <p:sp>
-        <p:nvSpPr>
-          <p:cNvPr id="21" name="CuadroTexto 20">
-            <a:extLst>
-              <a:ext uri="{FF2B5EF4-FFF2-40B4-BE49-F238E27FC236}">
-                <a16:creationId xmlns:a16="http://schemas.microsoft.com/office/drawing/2014/main" id="{F8151BB7-52B9-4035-A738-BD140D5D48F6}"/>
-              </a:ext>
-            </a:extLst>
-          </p:cNvPr>
-          <p:cNvSpPr txBox="1"/>
-          <p:nvPr/>
-        </p:nvSpPr>
-        <p:spPr>
-          <a:xfrm>
-            <a:off x="1774234" y="1294486"/>
-            <a:ext cx="1325461" cy="307777"/>
-          </a:xfrm>
-          <a:prstGeom prst="rect">
-            <a:avLst/>
-          </a:prstGeom>
-          <a:solidFill>
-            <a:schemeClr val="bg1">
-              <a:lumMod val="75000"/>
-            </a:schemeClr>
-          </a:solidFill>
-          <a:ln>
-            <a:solidFill>
-              <a:schemeClr val="tx1"/>
-            </a:solidFill>
-          </a:ln>
-        </p:spPr>
-        <p:txBody>
-          <a:bodyPr wrap="square" rtlCol="0">
-            <a:spAutoFit/>
-          </a:bodyPr>
-          <a:lstStyle/>
-          <a:p>
-            <a:r>
-              <a:rPr lang="es-ES" sz="1400" dirty="0"/>
-              <a:t>Reverse</a:t>
-            </a:r>
-          </a:p>
-        </p:txBody>
-      </p:sp>
-      <p:sp>
-        <p:nvSpPr>
-          <p:cNvPr id="22" name="CuadroTexto 21">
-            <a:extLst>
-              <a:ext uri="{FF2B5EF4-FFF2-40B4-BE49-F238E27FC236}">
-                <a16:creationId xmlns:a16="http://schemas.microsoft.com/office/drawing/2014/main" id="{46F10B72-267E-4BFB-B14E-69572CFA8C21}"/>
-              </a:ext>
-            </a:extLst>
-          </p:cNvPr>
-          <p:cNvSpPr txBox="1"/>
-          <p:nvPr/>
-        </p:nvSpPr>
-        <p:spPr>
-          <a:xfrm>
-            <a:off x="1774234" y="1586903"/>
-            <a:ext cx="1325461" cy="307777"/>
-          </a:xfrm>
-          <a:prstGeom prst="rect">
-            <a:avLst/>
-          </a:prstGeom>
-          <a:solidFill>
-            <a:schemeClr val="bg1">
-              <a:lumMod val="75000"/>
-            </a:schemeClr>
-          </a:solidFill>
-          <a:ln>
-            <a:solidFill>
-              <a:schemeClr val="tx1"/>
-            </a:solidFill>
-          </a:ln>
-        </p:spPr>
-        <p:txBody>
-          <a:bodyPr wrap="square" rtlCol="0">
-            <a:spAutoFit/>
-          </a:bodyPr>
-          <a:lstStyle/>
-          <a:p>
-            <a:r>
-              <a:rPr lang="es-ES" sz="1400" dirty="0" err="1"/>
-              <a:t>Insert</a:t>
-            </a:r>
-            <a:r>
-              <a:rPr lang="es-ES" sz="1400" dirty="0"/>
-              <a:t> time</a:t>
-            </a:r>
-          </a:p>
-        </p:txBody>
-      </p:sp>
-      <p:sp>
-        <p:nvSpPr>
-          <p:cNvPr id="23" name="CuadroTexto 22">
-            <a:extLst>
-              <a:ext uri="{FF2B5EF4-FFF2-40B4-BE49-F238E27FC236}">
-                <a16:creationId xmlns:a16="http://schemas.microsoft.com/office/drawing/2014/main" id="{EAEA99F1-4674-46B3-9798-FADF21C40105}"/>
-              </a:ext>
-            </a:extLst>
-          </p:cNvPr>
-          <p:cNvSpPr txBox="1"/>
-          <p:nvPr/>
-        </p:nvSpPr>
-        <p:spPr>
-          <a:xfrm>
-            <a:off x="1774234" y="1897260"/>
-            <a:ext cx="1433568" cy="307777"/>
-          </a:xfrm>
-          <a:prstGeom prst="rect">
-            <a:avLst/>
-          </a:prstGeom>
-          <a:solidFill>
-            <a:schemeClr val="bg1">
-              <a:lumMod val="75000"/>
-            </a:schemeClr>
-          </a:solidFill>
-          <a:ln>
-            <a:solidFill>
-              <a:schemeClr val="tx1"/>
-            </a:solidFill>
-          </a:ln>
-        </p:spPr>
-        <p:txBody>
-          <a:bodyPr wrap="square" rtlCol="0">
-            <a:spAutoFit/>
-          </a:bodyPr>
-          <a:lstStyle/>
-          <a:p>
-            <a:r>
-              <a:rPr lang="es-ES" sz="1400" dirty="0" err="1"/>
-              <a:t>Correct</a:t>
-            </a:r>
-            <a:r>
-              <a:rPr lang="es-ES" sz="1400" dirty="0"/>
-              <a:t> </a:t>
-            </a:r>
-            <a:r>
-              <a:rPr lang="es-ES" sz="1400" dirty="0" err="1"/>
-              <a:t>elevation</a:t>
-            </a:r>
-            <a:endParaRPr lang="es-ES" sz="1400" dirty="0"/>
-          </a:p>
-        </p:txBody>
-      </p:sp>
-      <p:sp>
-        <p:nvSpPr>
-          <p:cNvPr id="24" name="CuadroTexto 23">
-            <a:extLst>
-              <a:ext uri="{FF2B5EF4-FFF2-40B4-BE49-F238E27FC236}">
-                <a16:creationId xmlns:a16="http://schemas.microsoft.com/office/drawing/2014/main" id="{8ADFD561-D90E-4185-8F9E-2A01AB69B558}"/>
-              </a:ext>
-            </a:extLst>
-          </p:cNvPr>
-          <p:cNvSpPr txBox="1"/>
-          <p:nvPr/>
-        </p:nvSpPr>
-        <p:spPr>
-          <a:xfrm>
-            <a:off x="1774233" y="2205037"/>
-            <a:ext cx="1325461" cy="307777"/>
-          </a:xfrm>
-          <a:prstGeom prst="rect">
-            <a:avLst/>
-          </a:prstGeom>
-          <a:solidFill>
-            <a:schemeClr val="bg1">
-              <a:lumMod val="75000"/>
-            </a:schemeClr>
-          </a:solidFill>
-          <a:ln>
-            <a:solidFill>
-              <a:schemeClr val="tx1"/>
-            </a:solidFill>
-          </a:ln>
-        </p:spPr>
-        <p:txBody>
-          <a:bodyPr wrap="square" rtlCol="0">
-            <a:spAutoFit/>
-          </a:bodyPr>
-          <a:lstStyle/>
-          <a:p>
-            <a:r>
-              <a:rPr lang="es-ES" sz="1400" dirty="0"/>
-              <a:t>Split</a:t>
-            </a:r>
-          </a:p>
-        </p:txBody>
-      </p:sp>
-      <p:sp>
-        <p:nvSpPr>
-          <p:cNvPr id="26" name="CuadroTexto 25">
-            <a:extLst>
-              <a:ext uri="{FF2B5EF4-FFF2-40B4-BE49-F238E27FC236}">
-                <a16:creationId xmlns:a16="http://schemas.microsoft.com/office/drawing/2014/main" id="{A0084574-BA24-4B78-AB48-EF00E1F0B4C8}"/>
-              </a:ext>
-            </a:extLst>
-          </p:cNvPr>
-          <p:cNvSpPr txBox="1"/>
-          <p:nvPr/>
-        </p:nvSpPr>
-        <p:spPr>
-          <a:xfrm>
-            <a:off x="253954" y="2184564"/>
-            <a:ext cx="1325461" cy="307777"/>
-          </a:xfrm>
-          <a:prstGeom prst="rect">
-            <a:avLst/>
-          </a:prstGeom>
-          <a:solidFill>
-            <a:schemeClr val="bg1">
-              <a:lumMod val="75000"/>
-            </a:schemeClr>
-          </a:solidFill>
-          <a:ln>
-            <a:solidFill>
-              <a:schemeClr val="tx1"/>
-            </a:solidFill>
-          </a:ln>
-        </p:spPr>
-        <p:txBody>
-          <a:bodyPr wrap="square" rtlCol="0">
-            <a:spAutoFit/>
-          </a:bodyPr>
-          <a:lstStyle/>
-          <a:p>
-            <a:r>
-              <a:rPr lang="es-ES" sz="1400" dirty="0" err="1"/>
-              <a:t>Save</a:t>
-            </a:r>
-            <a:r>
-              <a:rPr lang="es-ES" sz="1400" dirty="0"/>
-              <a:t> </a:t>
-            </a:r>
-            <a:r>
-              <a:rPr lang="es-ES" sz="1400" dirty="0" err="1"/>
-              <a:t>gpx</a:t>
-            </a:r>
-            <a:endParaRPr lang="es-ES" sz="1400" dirty="0"/>
-          </a:p>
-        </p:txBody>
-      </p:sp>
     </p:spTree>
     <p:extLst>
       <p:ext uri="{BB962C8B-B14F-4D97-AF65-F5344CB8AC3E}">

</xml_diff>

<commit_message>
Add time option implementation - New window to insert initial timestamp and speed - Add new column to track dataframe - Include timestamp in saved gpx files
</commit_message>
<xml_diff>
--- a/docs/gui_design.pptx
+++ b/docs/gui_design.pptx
@@ -15,8 +15,10 @@
     <p:sldId id="260" r:id="rId9"/>
     <p:sldId id="268" r:id="rId10"/>
     <p:sldId id="265" r:id="rId11"/>
-    <p:sldId id="264" r:id="rId12"/>
-    <p:sldId id="261" r:id="rId13"/>
+    <p:sldId id="269" r:id="rId12"/>
+    <p:sldId id="271" r:id="rId13"/>
+    <p:sldId id="264" r:id="rId14"/>
+    <p:sldId id="261" r:id="rId15"/>
   </p:sldIdLst>
   <p:sldSz cx="12192000" cy="6858000"/>
   <p:notesSz cx="6858000" cy="9144000"/>
@@ -324,7 +326,7 @@
           <a:p>
             <a:fld id="{B3E02414-0C21-4CC3-871B-2D6AD27EF3B6}" type="datetimeFigureOut">
               <a:rPr lang="es-ES" smtClean="0"/>
-              <a:t>15/06/2020</a:t>
+              <a:t>17/10/2020</a:t>
             </a:fld>
             <a:endParaRPr lang="es-ES"/>
           </a:p>
@@ -522,7 +524,7 @@
           <a:p>
             <a:fld id="{B3E02414-0C21-4CC3-871B-2D6AD27EF3B6}" type="datetimeFigureOut">
               <a:rPr lang="es-ES" smtClean="0"/>
-              <a:t>15/06/2020</a:t>
+              <a:t>17/10/2020</a:t>
             </a:fld>
             <a:endParaRPr lang="es-ES"/>
           </a:p>
@@ -730,7 +732,7 @@
           <a:p>
             <a:fld id="{B3E02414-0C21-4CC3-871B-2D6AD27EF3B6}" type="datetimeFigureOut">
               <a:rPr lang="es-ES" smtClean="0"/>
-              <a:t>15/06/2020</a:t>
+              <a:t>17/10/2020</a:t>
             </a:fld>
             <a:endParaRPr lang="es-ES"/>
           </a:p>
@@ -928,7 +930,7 @@
           <a:p>
             <a:fld id="{B3E02414-0C21-4CC3-871B-2D6AD27EF3B6}" type="datetimeFigureOut">
               <a:rPr lang="es-ES" smtClean="0"/>
-              <a:t>15/06/2020</a:t>
+              <a:t>17/10/2020</a:t>
             </a:fld>
             <a:endParaRPr lang="es-ES"/>
           </a:p>
@@ -1203,7 +1205,7 @@
           <a:p>
             <a:fld id="{B3E02414-0C21-4CC3-871B-2D6AD27EF3B6}" type="datetimeFigureOut">
               <a:rPr lang="es-ES" smtClean="0"/>
-              <a:t>15/06/2020</a:t>
+              <a:t>17/10/2020</a:t>
             </a:fld>
             <a:endParaRPr lang="es-ES"/>
           </a:p>
@@ -1468,7 +1470,7 @@
           <a:p>
             <a:fld id="{B3E02414-0C21-4CC3-871B-2D6AD27EF3B6}" type="datetimeFigureOut">
               <a:rPr lang="es-ES" smtClean="0"/>
-              <a:t>15/06/2020</a:t>
+              <a:t>17/10/2020</a:t>
             </a:fld>
             <a:endParaRPr lang="es-ES"/>
           </a:p>
@@ -1880,7 +1882,7 @@
           <a:p>
             <a:fld id="{B3E02414-0C21-4CC3-871B-2D6AD27EF3B6}" type="datetimeFigureOut">
               <a:rPr lang="es-ES" smtClean="0"/>
-              <a:t>15/06/2020</a:t>
+              <a:t>17/10/2020</a:t>
             </a:fld>
             <a:endParaRPr lang="es-ES"/>
           </a:p>
@@ -2021,7 +2023,7 @@
           <a:p>
             <a:fld id="{B3E02414-0C21-4CC3-871B-2D6AD27EF3B6}" type="datetimeFigureOut">
               <a:rPr lang="es-ES" smtClean="0"/>
-              <a:t>15/06/2020</a:t>
+              <a:t>17/10/2020</a:t>
             </a:fld>
             <a:endParaRPr lang="es-ES"/>
           </a:p>
@@ -2134,7 +2136,7 @@
           <a:p>
             <a:fld id="{B3E02414-0C21-4CC3-871B-2D6AD27EF3B6}" type="datetimeFigureOut">
               <a:rPr lang="es-ES" smtClean="0"/>
-              <a:t>15/06/2020</a:t>
+              <a:t>17/10/2020</a:t>
             </a:fld>
             <a:endParaRPr lang="es-ES"/>
           </a:p>
@@ -2445,7 +2447,7 @@
           <a:p>
             <a:fld id="{B3E02414-0C21-4CC3-871B-2D6AD27EF3B6}" type="datetimeFigureOut">
               <a:rPr lang="es-ES" smtClean="0"/>
-              <a:t>15/06/2020</a:t>
+              <a:t>17/10/2020</a:t>
             </a:fld>
             <a:endParaRPr lang="es-ES"/>
           </a:p>
@@ -2733,7 +2735,7 @@
           <a:p>
             <a:fld id="{B3E02414-0C21-4CC3-871B-2D6AD27EF3B6}" type="datetimeFigureOut">
               <a:rPr lang="es-ES" smtClean="0"/>
-              <a:t>15/06/2020</a:t>
+              <a:t>17/10/2020</a:t>
             </a:fld>
             <a:endParaRPr lang="es-ES"/>
           </a:p>
@@ -2974,7 +2976,7 @@
           <a:p>
             <a:fld id="{B3E02414-0C21-4CC3-871B-2D6AD27EF3B6}" type="datetimeFigureOut">
               <a:rPr lang="es-ES" smtClean="0"/>
-              <a:t>15/06/2020</a:t>
+              <a:t>17/10/2020</a:t>
             </a:fld>
             <a:endParaRPr lang="es-ES"/>
           </a:p>
@@ -3932,7 +3934,7 @@
         </p:nvSpPr>
         <p:spPr>
           <a:xfrm>
-            <a:off x="254252" y="2492167"/>
+            <a:off x="253116" y="2492167"/>
             <a:ext cx="1325461" cy="307777"/>
           </a:xfrm>
           <a:prstGeom prst="rect">
@@ -4658,7 +4660,7 @@
         </p:nvSpPr>
         <p:spPr>
           <a:xfrm>
-            <a:off x="253954" y="2184564"/>
+            <a:off x="252818" y="2184564"/>
             <a:ext cx="1325461" cy="307777"/>
           </a:xfrm>
           <a:prstGeom prst="rect">
@@ -4836,6 +4838,295 @@
       </p:pic>
       <p:sp>
         <p:nvSpPr>
+          <p:cNvPr id="8" name="CuadroTexto 7">
+            <a:extLst>
+              <a:ext uri="{FF2B5EF4-FFF2-40B4-BE49-F238E27FC236}">
+                <a16:creationId xmlns:a16="http://schemas.microsoft.com/office/drawing/2014/main" id="{87D8C68F-3C3F-474E-B2E2-87E9ABCA7C2D}"/>
+              </a:ext>
+            </a:extLst>
+          </p:cNvPr>
+          <p:cNvSpPr txBox="1"/>
+          <p:nvPr/>
+        </p:nvSpPr>
+        <p:spPr>
+          <a:xfrm>
+            <a:off x="99008" y="617377"/>
+            <a:ext cx="964734" cy="369332"/>
+          </a:xfrm>
+          <a:prstGeom prst="rect">
+            <a:avLst/>
+          </a:prstGeom>
+          <a:solidFill>
+            <a:schemeClr val="bg1">
+              <a:lumMod val="75000"/>
+            </a:schemeClr>
+          </a:solidFill>
+          <a:ln>
+            <a:solidFill>
+              <a:schemeClr val="tx1"/>
+            </a:solidFill>
+          </a:ln>
+        </p:spPr>
+        <p:txBody>
+          <a:bodyPr wrap="square" rtlCol="0">
+            <a:spAutoFit/>
+          </a:bodyPr>
+          <a:lstStyle/>
+          <a:p>
+            <a:r>
+              <a:rPr lang="es-ES" dirty="0"/>
+              <a:t>File</a:t>
+            </a:r>
+          </a:p>
+        </p:txBody>
+      </p:sp>
+      <p:sp>
+        <p:nvSpPr>
+          <p:cNvPr id="9" name="CuadroTexto 8">
+            <a:extLst>
+              <a:ext uri="{FF2B5EF4-FFF2-40B4-BE49-F238E27FC236}">
+                <a16:creationId xmlns:a16="http://schemas.microsoft.com/office/drawing/2014/main" id="{69B7775D-6619-47FA-95FC-2BFF98F90E33}"/>
+              </a:ext>
+            </a:extLst>
+          </p:cNvPr>
+          <p:cNvSpPr txBox="1"/>
+          <p:nvPr/>
+        </p:nvSpPr>
+        <p:spPr>
+          <a:xfrm>
+            <a:off x="250008" y="986709"/>
+            <a:ext cx="1325461" cy="307777"/>
+          </a:xfrm>
+          <a:prstGeom prst="rect">
+            <a:avLst/>
+          </a:prstGeom>
+          <a:solidFill>
+            <a:schemeClr val="bg1">
+              <a:lumMod val="75000"/>
+            </a:schemeClr>
+          </a:solidFill>
+          <a:ln>
+            <a:solidFill>
+              <a:schemeClr val="tx1"/>
+            </a:solidFill>
+          </a:ln>
+        </p:spPr>
+        <p:txBody>
+          <a:bodyPr wrap="square" rtlCol="0">
+            <a:spAutoFit/>
+          </a:bodyPr>
+          <a:lstStyle/>
+          <a:p>
+            <a:r>
+              <a:rPr lang="es-ES" sz="1400" dirty="0"/>
+              <a:t>Load </a:t>
+            </a:r>
+            <a:r>
+              <a:rPr lang="es-ES" sz="1400" dirty="0" err="1"/>
+              <a:t>track</a:t>
+            </a:r>
+            <a:endParaRPr lang="es-ES" sz="1400" dirty="0"/>
+          </a:p>
+        </p:txBody>
+      </p:sp>
+      <p:sp>
+        <p:nvSpPr>
+          <p:cNvPr id="10" name="CuadroTexto 9">
+            <a:extLst>
+              <a:ext uri="{FF2B5EF4-FFF2-40B4-BE49-F238E27FC236}">
+                <a16:creationId xmlns:a16="http://schemas.microsoft.com/office/drawing/2014/main" id="{E6B399B8-DA52-4C30-972E-53ADA9421924}"/>
+              </a:ext>
+            </a:extLst>
+          </p:cNvPr>
+          <p:cNvSpPr txBox="1"/>
+          <p:nvPr/>
+        </p:nvSpPr>
+        <p:spPr>
+          <a:xfrm>
+            <a:off x="250007" y="1294486"/>
+            <a:ext cx="1325461" cy="307777"/>
+          </a:xfrm>
+          <a:prstGeom prst="rect">
+            <a:avLst/>
+          </a:prstGeom>
+          <a:solidFill>
+            <a:schemeClr val="bg1">
+              <a:lumMod val="75000"/>
+            </a:schemeClr>
+          </a:solidFill>
+          <a:ln>
+            <a:solidFill>
+              <a:schemeClr val="tx1"/>
+            </a:solidFill>
+          </a:ln>
+        </p:spPr>
+        <p:txBody>
+          <a:bodyPr wrap="square" rtlCol="0">
+            <a:spAutoFit/>
+          </a:bodyPr>
+          <a:lstStyle/>
+          <a:p>
+            <a:r>
+              <a:rPr lang="es-ES" sz="1400" dirty="0"/>
+              <a:t>Load </a:t>
+            </a:r>
+            <a:r>
+              <a:rPr lang="es-ES" sz="1400" dirty="0" err="1"/>
+              <a:t>session</a:t>
+            </a:r>
+            <a:endParaRPr lang="es-ES" sz="1400" dirty="0"/>
+          </a:p>
+        </p:txBody>
+      </p:sp>
+      <p:sp>
+        <p:nvSpPr>
+          <p:cNvPr id="11" name="CuadroTexto 10">
+            <a:extLst>
+              <a:ext uri="{FF2B5EF4-FFF2-40B4-BE49-F238E27FC236}">
+                <a16:creationId xmlns:a16="http://schemas.microsoft.com/office/drawing/2014/main" id="{D9B563DB-707C-4CD4-803E-C6573FDAE050}"/>
+              </a:ext>
+            </a:extLst>
+          </p:cNvPr>
+          <p:cNvSpPr txBox="1"/>
+          <p:nvPr/>
+        </p:nvSpPr>
+        <p:spPr>
+          <a:xfrm>
+            <a:off x="250007" y="1586903"/>
+            <a:ext cx="1325461" cy="307777"/>
+          </a:xfrm>
+          <a:prstGeom prst="rect">
+            <a:avLst/>
+          </a:prstGeom>
+          <a:solidFill>
+            <a:schemeClr val="bg1">
+              <a:lumMod val="75000"/>
+            </a:schemeClr>
+          </a:solidFill>
+          <a:ln>
+            <a:solidFill>
+              <a:schemeClr val="tx1"/>
+            </a:solidFill>
+          </a:ln>
+        </p:spPr>
+        <p:txBody>
+          <a:bodyPr wrap="square" rtlCol="0">
+            <a:spAutoFit/>
+          </a:bodyPr>
+          <a:lstStyle/>
+          <a:p>
+            <a:r>
+              <a:rPr lang="es-ES" sz="1400" dirty="0"/>
+              <a:t>New </a:t>
+            </a:r>
+            <a:r>
+              <a:rPr lang="es-ES" sz="1400" dirty="0" err="1"/>
+              <a:t>session</a:t>
+            </a:r>
+            <a:endParaRPr lang="es-ES" sz="1400" dirty="0"/>
+          </a:p>
+        </p:txBody>
+      </p:sp>
+      <p:sp>
+        <p:nvSpPr>
+          <p:cNvPr id="12" name="CuadroTexto 11">
+            <a:extLst>
+              <a:ext uri="{FF2B5EF4-FFF2-40B4-BE49-F238E27FC236}">
+                <a16:creationId xmlns:a16="http://schemas.microsoft.com/office/drawing/2014/main" id="{33980FAD-8BDF-4D61-BA99-FBF4A8BD191D}"/>
+              </a:ext>
+            </a:extLst>
+          </p:cNvPr>
+          <p:cNvSpPr txBox="1"/>
+          <p:nvPr/>
+        </p:nvSpPr>
+        <p:spPr>
+          <a:xfrm>
+            <a:off x="250007" y="1876788"/>
+            <a:ext cx="1325461" cy="307777"/>
+          </a:xfrm>
+          <a:prstGeom prst="rect">
+            <a:avLst/>
+          </a:prstGeom>
+          <a:solidFill>
+            <a:schemeClr val="bg1">
+              <a:lumMod val="75000"/>
+            </a:schemeClr>
+          </a:solidFill>
+          <a:ln>
+            <a:solidFill>
+              <a:schemeClr val="tx1"/>
+            </a:solidFill>
+          </a:ln>
+        </p:spPr>
+        <p:txBody>
+          <a:bodyPr wrap="square" rtlCol="0">
+            <a:spAutoFit/>
+          </a:bodyPr>
+          <a:lstStyle/>
+          <a:p>
+            <a:r>
+              <a:rPr lang="es-ES" sz="1400" dirty="0" err="1"/>
+              <a:t>Save</a:t>
+            </a:r>
+            <a:r>
+              <a:rPr lang="es-ES" sz="1400" dirty="0"/>
+              <a:t> </a:t>
+            </a:r>
+            <a:r>
+              <a:rPr lang="es-ES" sz="1400" dirty="0" err="1"/>
+              <a:t>session</a:t>
+            </a:r>
+            <a:endParaRPr lang="es-ES" sz="1400" dirty="0"/>
+          </a:p>
+        </p:txBody>
+      </p:sp>
+      <p:sp>
+        <p:nvSpPr>
+          <p:cNvPr id="13" name="CuadroTexto 12">
+            <a:extLst>
+              <a:ext uri="{FF2B5EF4-FFF2-40B4-BE49-F238E27FC236}">
+                <a16:creationId xmlns:a16="http://schemas.microsoft.com/office/drawing/2014/main" id="{785F6E4A-3AFF-444D-931D-D0FEA190FED5}"/>
+              </a:ext>
+            </a:extLst>
+          </p:cNvPr>
+          <p:cNvSpPr txBox="1"/>
+          <p:nvPr/>
+        </p:nvSpPr>
+        <p:spPr>
+          <a:xfrm>
+            <a:off x="244727" y="2492167"/>
+            <a:ext cx="1325461" cy="307777"/>
+          </a:xfrm>
+          <a:prstGeom prst="rect">
+            <a:avLst/>
+          </a:prstGeom>
+          <a:solidFill>
+            <a:schemeClr val="bg1">
+              <a:lumMod val="75000"/>
+            </a:schemeClr>
+          </a:solidFill>
+          <a:ln>
+            <a:solidFill>
+              <a:schemeClr val="tx1"/>
+            </a:solidFill>
+          </a:ln>
+        </p:spPr>
+        <p:txBody>
+          <a:bodyPr wrap="square" rtlCol="0">
+            <a:spAutoFit/>
+          </a:bodyPr>
+          <a:lstStyle/>
+          <a:p>
+            <a:r>
+              <a:rPr lang="es-ES" sz="1400" dirty="0" err="1"/>
+              <a:t>Exit</a:t>
+            </a:r>
+            <a:endParaRPr lang="es-ES" sz="1400" dirty="0"/>
+          </a:p>
+        </p:txBody>
+      </p:sp>
+      <p:sp>
+        <p:nvSpPr>
           <p:cNvPr id="14" name="CuadroTexto 13">
             <a:extLst>
               <a:ext uri="{FF2B5EF4-FFF2-40B4-BE49-F238E27FC236}">
@@ -4849,7 +5140,7 @@
         <p:spPr>
           <a:xfrm>
             <a:off x="8783273" y="234892"/>
-            <a:ext cx="3087149" cy="1200329"/>
+            <a:ext cx="3087149" cy="2308324"/>
           </a:xfrm>
           <a:prstGeom prst="rect">
             <a:avLst/>
@@ -4874,7 +5165,7 @@
             </a:pPr>
             <a:r>
               <a:rPr lang="es-ES" dirty="0"/>
-              <a:t>V01.00</a:t>
+              <a:t>V00.09</a:t>
             </a:r>
           </a:p>
           <a:p>
@@ -4884,28 +5175,9 @@
             </a:pPr>
             <a:r>
               <a:rPr lang="es-ES" dirty="0" err="1"/>
-              <a:t>All</a:t>
-            </a:r>
-            <a:r>
-              <a:rPr lang="es-ES" dirty="0"/>
-              <a:t> </a:t>
-            </a:r>
-            <a:r>
-              <a:rPr lang="es-ES" dirty="0" err="1"/>
-              <a:t>edit</a:t>
-            </a:r>
-            <a:r>
-              <a:rPr lang="es-ES" dirty="0"/>
-              <a:t> </a:t>
-            </a:r>
-            <a:r>
-              <a:rPr lang="es-ES" dirty="0" err="1"/>
-              <a:t>features</a:t>
-            </a:r>
-            <a:r>
-              <a:rPr lang="es-ES" dirty="0"/>
-              <a:t> </a:t>
-            </a:r>
+              <a:t>Cut</a:t>
+            </a:r>
+            <a:endParaRPr lang="es-ES" dirty="0"/>
           </a:p>
           <a:p>
             <a:pPr marL="285750" indent="-285750">
@@ -4913,8 +5185,52 @@
               <a:buChar char="-"/>
             </a:pPr>
             <a:r>
+              <a:rPr lang="es-ES" dirty="0"/>
+              <a:t>Reverse</a:t>
+            </a:r>
+            <a:r>
+              <a:rPr lang="en-US" dirty="0"/>
+              <a:t> ✔</a:t>
+            </a:r>
+            <a:endParaRPr lang="es-ES" dirty="0"/>
+          </a:p>
+          <a:p>
+            <a:pPr marL="285750" indent="-285750">
+              <a:buFontTx/>
+              <a:buChar char="-"/>
+            </a:pPr>
+            <a:r>
+              <a:rPr lang="es-ES" dirty="0"/>
+              <a:t>Split</a:t>
+            </a:r>
+          </a:p>
+          <a:p>
+            <a:pPr marL="285750" indent="-285750">
+              <a:buFontTx/>
+              <a:buChar char="-"/>
+            </a:pPr>
+            <a:r>
               <a:rPr lang="es-ES" dirty="0" err="1"/>
-              <a:t>Working</a:t>
+              <a:t>Insert</a:t>
+            </a:r>
+            <a:r>
+              <a:rPr lang="es-ES" dirty="0"/>
+              <a:t> time </a:t>
+            </a:r>
+            <a:r>
+              <a:rPr lang="en-US" dirty="0"/>
+              <a:t>✔</a:t>
+            </a:r>
+            <a:endParaRPr lang="es-ES" dirty="0"/>
+          </a:p>
+          <a:p>
+            <a:pPr marL="285750" indent="-285750">
+              <a:buFontTx/>
+              <a:buChar char="-"/>
+            </a:pPr>
+            <a:r>
+              <a:rPr lang="es-ES" dirty="0" err="1"/>
+              <a:t>Fix</a:t>
             </a:r>
             <a:r>
               <a:rPr lang="es-ES" dirty="0"/>
@@ -4922,7 +5238,935 @@
             </a:r>
             <a:r>
               <a:rPr lang="es-ES" dirty="0" err="1"/>
-              <a:t>unit</a:t>
+              <a:t>elevation</a:t>
+            </a:r>
+            <a:endParaRPr lang="es-ES" dirty="0"/>
+          </a:p>
+          <a:p>
+            <a:endParaRPr lang="es-ES" dirty="0"/>
+          </a:p>
+        </p:txBody>
+      </p:sp>
+      <p:grpSp>
+        <p:nvGrpSpPr>
+          <p:cNvPr id="18" name="Grupo 17">
+            <a:extLst>
+              <a:ext uri="{FF2B5EF4-FFF2-40B4-BE49-F238E27FC236}">
+                <a16:creationId xmlns:a16="http://schemas.microsoft.com/office/drawing/2014/main" id="{CE082FDB-5094-4F0F-8661-7B8640501D0A}"/>
+              </a:ext>
+            </a:extLst>
+          </p:cNvPr>
+          <p:cNvGrpSpPr/>
+          <p:nvPr/>
+        </p:nvGrpSpPr>
+        <p:grpSpPr>
+          <a:xfrm>
+            <a:off x="7945770" y="3897247"/>
+            <a:ext cx="267052" cy="615554"/>
+            <a:chOff x="8851781" y="2520917"/>
+            <a:chExt cx="267052" cy="615554"/>
+          </a:xfrm>
+        </p:grpSpPr>
+        <p:sp>
+          <p:nvSpPr>
+            <p:cNvPr id="16" name="CuadroTexto 15">
+              <a:extLst>
+                <a:ext uri="{FF2B5EF4-FFF2-40B4-BE49-F238E27FC236}">
+                  <a16:creationId xmlns:a16="http://schemas.microsoft.com/office/drawing/2014/main" id="{19713EAB-5261-4665-91F7-2DFD19C8A273}"/>
+                </a:ext>
+              </a:extLst>
+            </p:cNvPr>
+            <p:cNvSpPr txBox="1"/>
+            <p:nvPr/>
+          </p:nvSpPr>
+          <p:spPr>
+            <a:xfrm>
+              <a:off x="8851782" y="2520917"/>
+              <a:ext cx="267051" cy="307777"/>
+            </a:xfrm>
+            <a:prstGeom prst="rect">
+              <a:avLst/>
+            </a:prstGeom>
+            <a:solidFill>
+              <a:schemeClr val="bg1">
+                <a:lumMod val="85000"/>
+              </a:schemeClr>
+            </a:solidFill>
+            <a:ln>
+              <a:solidFill>
+                <a:schemeClr val="tx1"/>
+              </a:solidFill>
+            </a:ln>
+          </p:spPr>
+          <p:txBody>
+            <a:bodyPr wrap="square" rtlCol="0">
+              <a:spAutoFit/>
+            </a:bodyPr>
+            <a:lstStyle/>
+            <a:p>
+              <a:pPr algn="ctr"/>
+              <a:r>
+                <a:rPr lang="es-ES" sz="1400" dirty="0"/>
+                <a:t>+</a:t>
+              </a:r>
+            </a:p>
+          </p:txBody>
+        </p:sp>
+        <p:sp>
+          <p:nvSpPr>
+            <p:cNvPr id="17" name="CuadroTexto 16">
+              <a:extLst>
+                <a:ext uri="{FF2B5EF4-FFF2-40B4-BE49-F238E27FC236}">
+                  <a16:creationId xmlns:a16="http://schemas.microsoft.com/office/drawing/2014/main" id="{F98C1302-45BF-449D-BD36-6743087E2F05}"/>
+                </a:ext>
+              </a:extLst>
+            </p:cNvPr>
+            <p:cNvSpPr txBox="1"/>
+            <p:nvPr/>
+          </p:nvSpPr>
+          <p:spPr>
+            <a:xfrm>
+              <a:off x="8851781" y="2828694"/>
+              <a:ext cx="267051" cy="307777"/>
+            </a:xfrm>
+            <a:prstGeom prst="rect">
+              <a:avLst/>
+            </a:prstGeom>
+            <a:solidFill>
+              <a:schemeClr val="bg1">
+                <a:lumMod val="85000"/>
+              </a:schemeClr>
+            </a:solidFill>
+            <a:ln>
+              <a:solidFill>
+                <a:schemeClr val="tx1"/>
+              </a:solidFill>
+            </a:ln>
+          </p:spPr>
+          <p:txBody>
+            <a:bodyPr wrap="square" rtlCol="0">
+              <a:spAutoFit/>
+            </a:bodyPr>
+            <a:lstStyle/>
+            <a:p>
+              <a:pPr algn="ctr"/>
+              <a:r>
+                <a:rPr lang="es-ES" sz="1400" dirty="0"/>
+                <a:t>-</a:t>
+              </a:r>
+            </a:p>
+          </p:txBody>
+        </p:sp>
+      </p:grpSp>
+      <p:sp>
+        <p:nvSpPr>
+          <p:cNvPr id="19" name="CuadroTexto 18">
+            <a:extLst>
+              <a:ext uri="{FF2B5EF4-FFF2-40B4-BE49-F238E27FC236}">
+                <a16:creationId xmlns:a16="http://schemas.microsoft.com/office/drawing/2014/main" id="{D6388275-7A37-4C1C-AEE0-BCB3DB9E4552}"/>
+              </a:ext>
+            </a:extLst>
+          </p:cNvPr>
+          <p:cNvSpPr txBox="1"/>
+          <p:nvPr/>
+        </p:nvSpPr>
+        <p:spPr>
+          <a:xfrm>
+            <a:off x="1623235" y="617377"/>
+            <a:ext cx="964734" cy="369332"/>
+          </a:xfrm>
+          <a:prstGeom prst="rect">
+            <a:avLst/>
+          </a:prstGeom>
+          <a:solidFill>
+            <a:schemeClr val="bg1">
+              <a:lumMod val="75000"/>
+            </a:schemeClr>
+          </a:solidFill>
+          <a:ln>
+            <a:solidFill>
+              <a:schemeClr val="tx1"/>
+            </a:solidFill>
+          </a:ln>
+        </p:spPr>
+        <p:txBody>
+          <a:bodyPr wrap="square" rtlCol="0">
+            <a:spAutoFit/>
+          </a:bodyPr>
+          <a:lstStyle/>
+          <a:p>
+            <a:r>
+              <a:rPr lang="es-ES" dirty="0" err="1"/>
+              <a:t>Edit</a:t>
+            </a:r>
+            <a:endParaRPr lang="es-ES" dirty="0"/>
+          </a:p>
+        </p:txBody>
+      </p:sp>
+      <p:sp>
+        <p:nvSpPr>
+          <p:cNvPr id="20" name="CuadroTexto 19">
+            <a:extLst>
+              <a:ext uri="{FF2B5EF4-FFF2-40B4-BE49-F238E27FC236}">
+                <a16:creationId xmlns:a16="http://schemas.microsoft.com/office/drawing/2014/main" id="{0C264CB2-A6FA-4E6B-AE91-CFBA18F78ADA}"/>
+              </a:ext>
+            </a:extLst>
+          </p:cNvPr>
+          <p:cNvSpPr txBox="1"/>
+          <p:nvPr/>
+        </p:nvSpPr>
+        <p:spPr>
+          <a:xfrm>
+            <a:off x="1774235" y="986709"/>
+            <a:ext cx="1325461" cy="307777"/>
+          </a:xfrm>
+          <a:prstGeom prst="rect">
+            <a:avLst/>
+          </a:prstGeom>
+          <a:solidFill>
+            <a:schemeClr val="bg1">
+              <a:lumMod val="75000"/>
+            </a:schemeClr>
+          </a:solidFill>
+          <a:ln>
+            <a:solidFill>
+              <a:schemeClr val="tx1"/>
+            </a:solidFill>
+          </a:ln>
+        </p:spPr>
+        <p:txBody>
+          <a:bodyPr wrap="square" rtlCol="0">
+            <a:spAutoFit/>
+          </a:bodyPr>
+          <a:lstStyle/>
+          <a:p>
+            <a:r>
+              <a:rPr lang="es-ES" sz="1400" dirty="0" err="1"/>
+              <a:t>Cut</a:t>
+            </a:r>
+            <a:endParaRPr lang="es-ES" sz="1400" dirty="0"/>
+          </a:p>
+        </p:txBody>
+      </p:sp>
+      <p:sp>
+        <p:nvSpPr>
+          <p:cNvPr id="21" name="CuadroTexto 20">
+            <a:extLst>
+              <a:ext uri="{FF2B5EF4-FFF2-40B4-BE49-F238E27FC236}">
+                <a16:creationId xmlns:a16="http://schemas.microsoft.com/office/drawing/2014/main" id="{F8151BB7-52B9-4035-A738-BD140D5D48F6}"/>
+              </a:ext>
+            </a:extLst>
+          </p:cNvPr>
+          <p:cNvSpPr txBox="1"/>
+          <p:nvPr/>
+        </p:nvSpPr>
+        <p:spPr>
+          <a:xfrm>
+            <a:off x="1774234" y="1294486"/>
+            <a:ext cx="1325461" cy="307777"/>
+          </a:xfrm>
+          <a:prstGeom prst="rect">
+            <a:avLst/>
+          </a:prstGeom>
+          <a:solidFill>
+            <a:schemeClr val="bg1">
+              <a:lumMod val="75000"/>
+            </a:schemeClr>
+          </a:solidFill>
+          <a:ln>
+            <a:solidFill>
+              <a:schemeClr val="tx1"/>
+            </a:solidFill>
+          </a:ln>
+        </p:spPr>
+        <p:txBody>
+          <a:bodyPr wrap="square" rtlCol="0">
+            <a:spAutoFit/>
+          </a:bodyPr>
+          <a:lstStyle/>
+          <a:p>
+            <a:r>
+              <a:rPr lang="es-ES" sz="1400" dirty="0"/>
+              <a:t>Reverse</a:t>
+            </a:r>
+          </a:p>
+        </p:txBody>
+      </p:sp>
+      <p:sp>
+        <p:nvSpPr>
+          <p:cNvPr id="22" name="CuadroTexto 21">
+            <a:extLst>
+              <a:ext uri="{FF2B5EF4-FFF2-40B4-BE49-F238E27FC236}">
+                <a16:creationId xmlns:a16="http://schemas.microsoft.com/office/drawing/2014/main" id="{46F10B72-267E-4BFB-B14E-69572CFA8C21}"/>
+              </a:ext>
+            </a:extLst>
+          </p:cNvPr>
+          <p:cNvSpPr txBox="1"/>
+          <p:nvPr/>
+        </p:nvSpPr>
+        <p:spPr>
+          <a:xfrm>
+            <a:off x="1774234" y="1586903"/>
+            <a:ext cx="1325461" cy="307777"/>
+          </a:xfrm>
+          <a:prstGeom prst="rect">
+            <a:avLst/>
+          </a:prstGeom>
+          <a:solidFill>
+            <a:schemeClr val="bg1">
+              <a:lumMod val="75000"/>
+            </a:schemeClr>
+          </a:solidFill>
+          <a:ln>
+            <a:solidFill>
+              <a:schemeClr val="tx1"/>
+            </a:solidFill>
+          </a:ln>
+        </p:spPr>
+        <p:txBody>
+          <a:bodyPr wrap="square" rtlCol="0">
+            <a:spAutoFit/>
+          </a:bodyPr>
+          <a:lstStyle/>
+          <a:p>
+            <a:r>
+              <a:rPr lang="es-ES" sz="1400" dirty="0" err="1"/>
+              <a:t>Insert</a:t>
+            </a:r>
+            <a:r>
+              <a:rPr lang="es-ES" sz="1400" dirty="0"/>
+              <a:t> time</a:t>
+            </a:r>
+          </a:p>
+        </p:txBody>
+      </p:sp>
+      <p:sp>
+        <p:nvSpPr>
+          <p:cNvPr id="23" name="CuadroTexto 22">
+            <a:extLst>
+              <a:ext uri="{FF2B5EF4-FFF2-40B4-BE49-F238E27FC236}">
+                <a16:creationId xmlns:a16="http://schemas.microsoft.com/office/drawing/2014/main" id="{EAEA99F1-4674-46B3-9798-FADF21C40105}"/>
+              </a:ext>
+            </a:extLst>
+          </p:cNvPr>
+          <p:cNvSpPr txBox="1"/>
+          <p:nvPr/>
+        </p:nvSpPr>
+        <p:spPr>
+          <a:xfrm>
+            <a:off x="1774234" y="1897260"/>
+            <a:ext cx="1433568" cy="307777"/>
+          </a:xfrm>
+          <a:prstGeom prst="rect">
+            <a:avLst/>
+          </a:prstGeom>
+          <a:solidFill>
+            <a:schemeClr val="bg1">
+              <a:lumMod val="75000"/>
+            </a:schemeClr>
+          </a:solidFill>
+          <a:ln>
+            <a:solidFill>
+              <a:schemeClr val="tx1"/>
+            </a:solidFill>
+          </a:ln>
+        </p:spPr>
+        <p:txBody>
+          <a:bodyPr wrap="square" rtlCol="0">
+            <a:spAutoFit/>
+          </a:bodyPr>
+          <a:lstStyle/>
+          <a:p>
+            <a:r>
+              <a:rPr lang="es-ES" sz="1400" dirty="0" err="1"/>
+              <a:t>Correct</a:t>
+            </a:r>
+            <a:r>
+              <a:rPr lang="es-ES" sz="1400" dirty="0"/>
+              <a:t> </a:t>
+            </a:r>
+            <a:r>
+              <a:rPr lang="es-ES" sz="1400" dirty="0" err="1"/>
+              <a:t>elevation</a:t>
+            </a:r>
+            <a:endParaRPr lang="es-ES" sz="1400" dirty="0"/>
+          </a:p>
+        </p:txBody>
+      </p:sp>
+      <p:sp>
+        <p:nvSpPr>
+          <p:cNvPr id="24" name="CuadroTexto 23">
+            <a:extLst>
+              <a:ext uri="{FF2B5EF4-FFF2-40B4-BE49-F238E27FC236}">
+                <a16:creationId xmlns:a16="http://schemas.microsoft.com/office/drawing/2014/main" id="{8ADFD561-D90E-4185-8F9E-2A01AB69B558}"/>
+              </a:ext>
+            </a:extLst>
+          </p:cNvPr>
+          <p:cNvSpPr txBox="1"/>
+          <p:nvPr/>
+        </p:nvSpPr>
+        <p:spPr>
+          <a:xfrm>
+            <a:off x="1774233" y="2205037"/>
+            <a:ext cx="1325461" cy="307777"/>
+          </a:xfrm>
+          <a:prstGeom prst="rect">
+            <a:avLst/>
+          </a:prstGeom>
+          <a:solidFill>
+            <a:schemeClr val="bg1">
+              <a:lumMod val="75000"/>
+            </a:schemeClr>
+          </a:solidFill>
+          <a:ln>
+            <a:solidFill>
+              <a:schemeClr val="tx1"/>
+            </a:solidFill>
+          </a:ln>
+        </p:spPr>
+        <p:txBody>
+          <a:bodyPr wrap="square" rtlCol="0">
+            <a:spAutoFit/>
+          </a:bodyPr>
+          <a:lstStyle/>
+          <a:p>
+            <a:r>
+              <a:rPr lang="es-ES" sz="1400" dirty="0"/>
+              <a:t>Split</a:t>
+            </a:r>
+          </a:p>
+        </p:txBody>
+      </p:sp>
+      <p:sp>
+        <p:nvSpPr>
+          <p:cNvPr id="26" name="CuadroTexto 25">
+            <a:extLst>
+              <a:ext uri="{FF2B5EF4-FFF2-40B4-BE49-F238E27FC236}">
+                <a16:creationId xmlns:a16="http://schemas.microsoft.com/office/drawing/2014/main" id="{A0084574-BA24-4B78-AB48-EF00E1F0B4C8}"/>
+              </a:ext>
+            </a:extLst>
+          </p:cNvPr>
+          <p:cNvSpPr txBox="1"/>
+          <p:nvPr/>
+        </p:nvSpPr>
+        <p:spPr>
+          <a:xfrm>
+            <a:off x="244429" y="2184564"/>
+            <a:ext cx="1325461" cy="307777"/>
+          </a:xfrm>
+          <a:prstGeom prst="rect">
+            <a:avLst/>
+          </a:prstGeom>
+          <a:solidFill>
+            <a:schemeClr val="bg1">
+              <a:lumMod val="75000"/>
+            </a:schemeClr>
+          </a:solidFill>
+          <a:ln>
+            <a:solidFill>
+              <a:schemeClr val="tx1"/>
+            </a:solidFill>
+          </a:ln>
+        </p:spPr>
+        <p:txBody>
+          <a:bodyPr wrap="square" rtlCol="0">
+            <a:spAutoFit/>
+          </a:bodyPr>
+          <a:lstStyle/>
+          <a:p>
+            <a:r>
+              <a:rPr lang="es-ES" sz="1400" dirty="0" err="1"/>
+              <a:t>Save</a:t>
+            </a:r>
+            <a:r>
+              <a:rPr lang="es-ES" sz="1400" dirty="0"/>
+              <a:t> </a:t>
+            </a:r>
+            <a:r>
+              <a:rPr lang="es-ES" sz="1400" dirty="0" err="1"/>
+              <a:t>gpx</a:t>
+            </a:r>
+            <a:endParaRPr lang="es-ES" sz="1400" dirty="0"/>
+          </a:p>
+        </p:txBody>
+      </p:sp>
+      <p:pic>
+        <p:nvPicPr>
+          <p:cNvPr id="27" name="Picture 2" descr="Rendered Image">
+            <a:extLst>
+              <a:ext uri="{FF2B5EF4-FFF2-40B4-BE49-F238E27FC236}">
+                <a16:creationId xmlns:a16="http://schemas.microsoft.com/office/drawing/2014/main" id="{BDEB4CBA-2856-4251-9CD5-4211BE3265F8}"/>
+              </a:ext>
+            </a:extLst>
+          </p:cNvPr>
+          <p:cNvPicPr>
+            <a:picLocks noChangeAspect="1" noChangeArrowheads="1"/>
+          </p:cNvPicPr>
+          <p:nvPr/>
+        </p:nvPicPr>
+        <p:blipFill>
+          <a:blip r:embed="rId4">
+            <a:extLst>
+              <a:ext uri="{28A0092B-C50C-407E-A947-70E740481C1C}">
+                <a14:useLocalDpi xmlns:a14="http://schemas.microsoft.com/office/drawing/2010/main" val="0"/>
+              </a:ext>
+            </a:extLst>
+          </a:blip>
+          <a:srcRect/>
+          <a:stretch>
+            <a:fillRect/>
+          </a:stretch>
+        </p:blipFill>
+        <p:spPr bwMode="auto">
+          <a:xfrm>
+            <a:off x="324331" y="5331161"/>
+            <a:ext cx="2181225" cy="809625"/>
+          </a:xfrm>
+          <a:prstGeom prst="rect">
+            <a:avLst/>
+          </a:prstGeom>
+          <a:noFill/>
+          <a:extLst>
+            <a:ext uri="{909E8E84-426E-40DD-AFC4-6F175D3DCCD1}">
+              <a14:hiddenFill xmlns:a14="http://schemas.microsoft.com/office/drawing/2010/main">
+                <a:solidFill>
+                  <a:srgbClr val="FFFFFF"/>
+                </a:solidFill>
+              </a14:hiddenFill>
+            </a:ext>
+          </a:extLst>
+        </p:spPr>
+      </p:pic>
+    </p:spTree>
+    <p:extLst>
+      <p:ext uri="{BB962C8B-B14F-4D97-AF65-F5344CB8AC3E}">
+        <p14:creationId xmlns:p14="http://schemas.microsoft.com/office/powerpoint/2010/main" val="1227934972"/>
+      </p:ext>
+    </p:extLst>
+  </p:cSld>
+  <p:clrMapOvr>
+    <a:masterClrMapping/>
+  </p:clrMapOvr>
+</p:sld>
+</file>
+
+<file path=ppt/slides/slide12.xml><?xml version="1.0" encoding="utf-8"?>
+<p:sld xmlns:a="http://schemas.openxmlformats.org/drawingml/2006/main" xmlns:r="http://schemas.openxmlformats.org/officeDocument/2006/relationships" xmlns:p="http://schemas.openxmlformats.org/presentationml/2006/main">
+  <p:cSld>
+    <p:spTree>
+      <p:nvGrpSpPr>
+        <p:cNvPr id="1" name=""/>
+        <p:cNvGrpSpPr/>
+        <p:nvPr/>
+      </p:nvGrpSpPr>
+      <p:grpSpPr>
+        <a:xfrm>
+          <a:off x="0" y="0"/>
+          <a:ext cx="0" cy="0"/>
+          <a:chOff x="0" y="0"/>
+          <a:chExt cx="0" cy="0"/>
+        </a:xfrm>
+      </p:grpSpPr>
+      <p:pic>
+        <p:nvPicPr>
+          <p:cNvPr id="5" name="Imagen 4">
+            <a:extLst>
+              <a:ext uri="{FF2B5EF4-FFF2-40B4-BE49-F238E27FC236}">
+                <a16:creationId xmlns:a16="http://schemas.microsoft.com/office/drawing/2014/main" id="{20B84089-D466-4D04-9783-CB6ADAAD6C96}"/>
+              </a:ext>
+            </a:extLst>
+          </p:cNvPr>
+          <p:cNvPicPr>
+            <a:picLocks noChangeAspect="1"/>
+          </p:cNvPicPr>
+          <p:nvPr/>
+        </p:nvPicPr>
+        <p:blipFill>
+          <a:blip r:embed="rId2"/>
+          <a:stretch>
+            <a:fillRect/>
+          </a:stretch>
+        </p:blipFill>
+        <p:spPr>
+          <a:xfrm>
+            <a:off x="3318057" y="1193683"/>
+            <a:ext cx="5087713" cy="3562875"/>
+          </a:xfrm>
+          <a:prstGeom prst="rect">
+            <a:avLst/>
+          </a:prstGeom>
+        </p:spPr>
+      </p:pic>
+      <p:pic>
+        <p:nvPicPr>
+          <p:cNvPr id="6" name="Imagen 5">
+            <a:extLst>
+              <a:ext uri="{FF2B5EF4-FFF2-40B4-BE49-F238E27FC236}">
+                <a16:creationId xmlns:a16="http://schemas.microsoft.com/office/drawing/2014/main" id="{4A8A3EDD-413E-4611-B0F7-F3E7B0E8B4B8}"/>
+              </a:ext>
+            </a:extLst>
+          </p:cNvPr>
+          <p:cNvPicPr>
+            <a:picLocks noChangeAspect="1"/>
+          </p:cNvPicPr>
+          <p:nvPr/>
+        </p:nvPicPr>
+        <p:blipFill>
+          <a:blip r:embed="rId3"/>
+          <a:stretch>
+            <a:fillRect/>
+          </a:stretch>
+        </p:blipFill>
+        <p:spPr>
+          <a:xfrm>
+            <a:off x="3216217" y="4884598"/>
+            <a:ext cx="5332428" cy="1411427"/>
+          </a:xfrm>
+          <a:prstGeom prst="rect">
+            <a:avLst/>
+          </a:prstGeom>
+        </p:spPr>
+      </p:pic>
+      <p:sp>
+        <p:nvSpPr>
+          <p:cNvPr id="8" name="CuadroTexto 7">
+            <a:extLst>
+              <a:ext uri="{FF2B5EF4-FFF2-40B4-BE49-F238E27FC236}">
+                <a16:creationId xmlns:a16="http://schemas.microsoft.com/office/drawing/2014/main" id="{87D8C68F-3C3F-474E-B2E2-87E9ABCA7C2D}"/>
+              </a:ext>
+            </a:extLst>
+          </p:cNvPr>
+          <p:cNvSpPr txBox="1"/>
+          <p:nvPr/>
+        </p:nvSpPr>
+        <p:spPr>
+          <a:xfrm>
+            <a:off x="99008" y="617377"/>
+            <a:ext cx="964734" cy="369332"/>
+          </a:xfrm>
+          <a:prstGeom prst="rect">
+            <a:avLst/>
+          </a:prstGeom>
+          <a:solidFill>
+            <a:schemeClr val="bg1">
+              <a:lumMod val="75000"/>
+            </a:schemeClr>
+          </a:solidFill>
+          <a:ln>
+            <a:solidFill>
+              <a:schemeClr val="tx1"/>
+            </a:solidFill>
+          </a:ln>
+        </p:spPr>
+        <p:txBody>
+          <a:bodyPr wrap="square" rtlCol="0">
+            <a:spAutoFit/>
+          </a:bodyPr>
+          <a:lstStyle/>
+          <a:p>
+            <a:r>
+              <a:rPr lang="es-ES" dirty="0"/>
+              <a:t>File</a:t>
+            </a:r>
+          </a:p>
+        </p:txBody>
+      </p:sp>
+      <p:sp>
+        <p:nvSpPr>
+          <p:cNvPr id="9" name="CuadroTexto 8">
+            <a:extLst>
+              <a:ext uri="{FF2B5EF4-FFF2-40B4-BE49-F238E27FC236}">
+                <a16:creationId xmlns:a16="http://schemas.microsoft.com/office/drawing/2014/main" id="{69B7775D-6619-47FA-95FC-2BFF98F90E33}"/>
+              </a:ext>
+            </a:extLst>
+          </p:cNvPr>
+          <p:cNvSpPr txBox="1"/>
+          <p:nvPr/>
+        </p:nvSpPr>
+        <p:spPr>
+          <a:xfrm>
+            <a:off x="250008" y="986709"/>
+            <a:ext cx="1325461" cy="307777"/>
+          </a:xfrm>
+          <a:prstGeom prst="rect">
+            <a:avLst/>
+          </a:prstGeom>
+          <a:solidFill>
+            <a:schemeClr val="bg1">
+              <a:lumMod val="75000"/>
+            </a:schemeClr>
+          </a:solidFill>
+          <a:ln>
+            <a:solidFill>
+              <a:schemeClr val="tx1"/>
+            </a:solidFill>
+          </a:ln>
+        </p:spPr>
+        <p:txBody>
+          <a:bodyPr wrap="square" rtlCol="0">
+            <a:spAutoFit/>
+          </a:bodyPr>
+          <a:lstStyle/>
+          <a:p>
+            <a:r>
+              <a:rPr lang="es-ES" sz="1400" dirty="0"/>
+              <a:t>Load </a:t>
+            </a:r>
+            <a:r>
+              <a:rPr lang="es-ES" sz="1400" dirty="0" err="1"/>
+              <a:t>track</a:t>
+            </a:r>
+            <a:endParaRPr lang="es-ES" sz="1400" dirty="0"/>
+          </a:p>
+        </p:txBody>
+      </p:sp>
+      <p:sp>
+        <p:nvSpPr>
+          <p:cNvPr id="10" name="CuadroTexto 9">
+            <a:extLst>
+              <a:ext uri="{FF2B5EF4-FFF2-40B4-BE49-F238E27FC236}">
+                <a16:creationId xmlns:a16="http://schemas.microsoft.com/office/drawing/2014/main" id="{E6B399B8-DA52-4C30-972E-53ADA9421924}"/>
+              </a:ext>
+            </a:extLst>
+          </p:cNvPr>
+          <p:cNvSpPr txBox="1"/>
+          <p:nvPr/>
+        </p:nvSpPr>
+        <p:spPr>
+          <a:xfrm>
+            <a:off x="250007" y="1294486"/>
+            <a:ext cx="1325461" cy="307777"/>
+          </a:xfrm>
+          <a:prstGeom prst="rect">
+            <a:avLst/>
+          </a:prstGeom>
+          <a:solidFill>
+            <a:schemeClr val="bg1">
+              <a:lumMod val="75000"/>
+            </a:schemeClr>
+          </a:solidFill>
+          <a:ln>
+            <a:solidFill>
+              <a:schemeClr val="tx1"/>
+            </a:solidFill>
+          </a:ln>
+        </p:spPr>
+        <p:txBody>
+          <a:bodyPr wrap="square" rtlCol="0">
+            <a:spAutoFit/>
+          </a:bodyPr>
+          <a:lstStyle/>
+          <a:p>
+            <a:r>
+              <a:rPr lang="es-ES" sz="1400" dirty="0"/>
+              <a:t>Load </a:t>
+            </a:r>
+            <a:r>
+              <a:rPr lang="es-ES" sz="1400" dirty="0" err="1"/>
+              <a:t>session</a:t>
+            </a:r>
+            <a:endParaRPr lang="es-ES" sz="1400" dirty="0"/>
+          </a:p>
+        </p:txBody>
+      </p:sp>
+      <p:sp>
+        <p:nvSpPr>
+          <p:cNvPr id="11" name="CuadroTexto 10">
+            <a:extLst>
+              <a:ext uri="{FF2B5EF4-FFF2-40B4-BE49-F238E27FC236}">
+                <a16:creationId xmlns:a16="http://schemas.microsoft.com/office/drawing/2014/main" id="{D9B563DB-707C-4CD4-803E-C6573FDAE050}"/>
+              </a:ext>
+            </a:extLst>
+          </p:cNvPr>
+          <p:cNvSpPr txBox="1"/>
+          <p:nvPr/>
+        </p:nvSpPr>
+        <p:spPr>
+          <a:xfrm>
+            <a:off x="250007" y="1586903"/>
+            <a:ext cx="1325461" cy="307777"/>
+          </a:xfrm>
+          <a:prstGeom prst="rect">
+            <a:avLst/>
+          </a:prstGeom>
+          <a:solidFill>
+            <a:schemeClr val="bg1">
+              <a:lumMod val="75000"/>
+            </a:schemeClr>
+          </a:solidFill>
+          <a:ln>
+            <a:solidFill>
+              <a:schemeClr val="tx1"/>
+            </a:solidFill>
+          </a:ln>
+        </p:spPr>
+        <p:txBody>
+          <a:bodyPr wrap="square" rtlCol="0">
+            <a:spAutoFit/>
+          </a:bodyPr>
+          <a:lstStyle/>
+          <a:p>
+            <a:r>
+              <a:rPr lang="es-ES" sz="1400" dirty="0"/>
+              <a:t>New </a:t>
+            </a:r>
+            <a:r>
+              <a:rPr lang="es-ES" sz="1400" dirty="0" err="1"/>
+              <a:t>session</a:t>
+            </a:r>
+            <a:endParaRPr lang="es-ES" sz="1400" dirty="0"/>
+          </a:p>
+        </p:txBody>
+      </p:sp>
+      <p:sp>
+        <p:nvSpPr>
+          <p:cNvPr id="12" name="CuadroTexto 11">
+            <a:extLst>
+              <a:ext uri="{FF2B5EF4-FFF2-40B4-BE49-F238E27FC236}">
+                <a16:creationId xmlns:a16="http://schemas.microsoft.com/office/drawing/2014/main" id="{33980FAD-8BDF-4D61-BA99-FBF4A8BD191D}"/>
+              </a:ext>
+            </a:extLst>
+          </p:cNvPr>
+          <p:cNvSpPr txBox="1"/>
+          <p:nvPr/>
+        </p:nvSpPr>
+        <p:spPr>
+          <a:xfrm>
+            <a:off x="250007" y="1876788"/>
+            <a:ext cx="1325461" cy="307777"/>
+          </a:xfrm>
+          <a:prstGeom prst="rect">
+            <a:avLst/>
+          </a:prstGeom>
+          <a:solidFill>
+            <a:schemeClr val="bg1">
+              <a:lumMod val="75000"/>
+            </a:schemeClr>
+          </a:solidFill>
+          <a:ln>
+            <a:solidFill>
+              <a:schemeClr val="tx1"/>
+            </a:solidFill>
+          </a:ln>
+        </p:spPr>
+        <p:txBody>
+          <a:bodyPr wrap="square" rtlCol="0">
+            <a:spAutoFit/>
+          </a:bodyPr>
+          <a:lstStyle/>
+          <a:p>
+            <a:r>
+              <a:rPr lang="es-ES" sz="1400" dirty="0" err="1"/>
+              <a:t>Save</a:t>
+            </a:r>
+            <a:r>
+              <a:rPr lang="es-ES" sz="1400" dirty="0"/>
+              <a:t> </a:t>
+            </a:r>
+            <a:r>
+              <a:rPr lang="es-ES" sz="1400" dirty="0" err="1"/>
+              <a:t>session</a:t>
+            </a:r>
+            <a:endParaRPr lang="es-ES" sz="1400" dirty="0"/>
+          </a:p>
+        </p:txBody>
+      </p:sp>
+      <p:sp>
+        <p:nvSpPr>
+          <p:cNvPr id="13" name="CuadroTexto 12">
+            <a:extLst>
+              <a:ext uri="{FF2B5EF4-FFF2-40B4-BE49-F238E27FC236}">
+                <a16:creationId xmlns:a16="http://schemas.microsoft.com/office/drawing/2014/main" id="{785F6E4A-3AFF-444D-931D-D0FEA190FED5}"/>
+              </a:ext>
+            </a:extLst>
+          </p:cNvPr>
+          <p:cNvSpPr txBox="1"/>
+          <p:nvPr/>
+        </p:nvSpPr>
+        <p:spPr>
+          <a:xfrm>
+            <a:off x="253116" y="2492167"/>
+            <a:ext cx="1325461" cy="307777"/>
+          </a:xfrm>
+          <a:prstGeom prst="rect">
+            <a:avLst/>
+          </a:prstGeom>
+          <a:solidFill>
+            <a:schemeClr val="bg1">
+              <a:lumMod val="75000"/>
+            </a:schemeClr>
+          </a:solidFill>
+          <a:ln>
+            <a:solidFill>
+              <a:schemeClr val="tx1"/>
+            </a:solidFill>
+          </a:ln>
+        </p:spPr>
+        <p:txBody>
+          <a:bodyPr wrap="square" rtlCol="0">
+            <a:spAutoFit/>
+          </a:bodyPr>
+          <a:lstStyle/>
+          <a:p>
+            <a:r>
+              <a:rPr lang="es-ES" sz="1400" dirty="0" err="1"/>
+              <a:t>Exit</a:t>
+            </a:r>
+            <a:endParaRPr lang="es-ES" sz="1400" dirty="0"/>
+          </a:p>
+        </p:txBody>
+      </p:sp>
+      <p:sp>
+        <p:nvSpPr>
+          <p:cNvPr id="14" name="CuadroTexto 13">
+            <a:extLst>
+              <a:ext uri="{FF2B5EF4-FFF2-40B4-BE49-F238E27FC236}">
+                <a16:creationId xmlns:a16="http://schemas.microsoft.com/office/drawing/2014/main" id="{141CAC72-0D93-49C6-8913-A7593E1C4044}"/>
+              </a:ext>
+            </a:extLst>
+          </p:cNvPr>
+          <p:cNvSpPr txBox="1"/>
+          <p:nvPr/>
+        </p:nvSpPr>
+        <p:spPr>
+          <a:xfrm>
+            <a:off x="8783273" y="234892"/>
+            <a:ext cx="3087149" cy="1754326"/>
+          </a:xfrm>
+          <a:prstGeom prst="rect">
+            <a:avLst/>
+          </a:prstGeom>
+          <a:noFill/>
+        </p:spPr>
+        <p:txBody>
+          <a:bodyPr wrap="square" rtlCol="0">
+            <a:spAutoFit/>
+          </a:bodyPr>
+          <a:lstStyle/>
+          <a:p>
+            <a:r>
+              <a:rPr lang="es-ES" dirty="0"/>
+              <a:t>Notes:</a:t>
+            </a:r>
+          </a:p>
+          <a:p>
+            <a:pPr marL="285750" indent="-285750">
+              <a:buFontTx/>
+              <a:buChar char="-"/>
+            </a:pPr>
+            <a:r>
+              <a:rPr lang="es-ES" dirty="0"/>
+              <a:t>V00.10</a:t>
+            </a:r>
+          </a:p>
+          <a:p>
+            <a:pPr marL="285750" indent="-285750">
+              <a:buFontTx/>
+              <a:buChar char="-"/>
+            </a:pPr>
+            <a:r>
+              <a:rPr lang="es-ES" dirty="0" err="1"/>
+              <a:t>Review</a:t>
             </a:r>
             <a:r>
               <a:rPr lang="es-ES" dirty="0"/>
@@ -4930,9 +6174,843 @@
             </a:r>
             <a:r>
               <a:rPr lang="es-ES" dirty="0" err="1"/>
+              <a:t>unit</a:t>
+            </a:r>
+            <a:r>
+              <a:rPr lang="es-ES" dirty="0"/>
+              <a:t> </a:t>
+            </a:r>
+            <a:r>
+              <a:rPr lang="es-ES" dirty="0" err="1"/>
               <a:t>tests</a:t>
             </a:r>
             <a:endParaRPr lang="es-ES" dirty="0"/>
+          </a:p>
+          <a:p>
+            <a:pPr marL="285750" indent="-285750">
+              <a:buFontTx/>
+              <a:buChar char="-"/>
+            </a:pPr>
+            <a:r>
+              <a:rPr lang="es-ES" dirty="0" err="1"/>
+              <a:t>Implement</a:t>
+            </a:r>
+            <a:r>
+              <a:rPr lang="es-ES" dirty="0"/>
+              <a:t> </a:t>
+            </a:r>
+            <a:r>
+              <a:rPr lang="es-ES" dirty="0" err="1"/>
+              <a:t>missing</a:t>
+            </a:r>
+            <a:r>
+              <a:rPr lang="es-ES" dirty="0"/>
+              <a:t> </a:t>
+            </a:r>
+            <a:r>
+              <a:rPr lang="es-ES" dirty="0" err="1"/>
+              <a:t>tests</a:t>
+            </a:r>
+            <a:endParaRPr lang="es-ES" dirty="0"/>
+          </a:p>
+          <a:p>
+            <a:pPr marL="285750" indent="-285750">
+              <a:buFontTx/>
+              <a:buChar char="-"/>
+            </a:pPr>
+            <a:endParaRPr lang="es-ES" dirty="0"/>
+          </a:p>
+          <a:p>
+            <a:endParaRPr lang="es-ES" dirty="0"/>
+          </a:p>
+        </p:txBody>
+      </p:sp>
+      <p:grpSp>
+        <p:nvGrpSpPr>
+          <p:cNvPr id="18" name="Grupo 17">
+            <a:extLst>
+              <a:ext uri="{FF2B5EF4-FFF2-40B4-BE49-F238E27FC236}">
+                <a16:creationId xmlns:a16="http://schemas.microsoft.com/office/drawing/2014/main" id="{CE082FDB-5094-4F0F-8661-7B8640501D0A}"/>
+              </a:ext>
+            </a:extLst>
+          </p:cNvPr>
+          <p:cNvGrpSpPr/>
+          <p:nvPr/>
+        </p:nvGrpSpPr>
+        <p:grpSpPr>
+          <a:xfrm>
+            <a:off x="7945770" y="3897247"/>
+            <a:ext cx="267052" cy="615554"/>
+            <a:chOff x="8851781" y="2520917"/>
+            <a:chExt cx="267052" cy="615554"/>
+          </a:xfrm>
+        </p:grpSpPr>
+        <p:sp>
+          <p:nvSpPr>
+            <p:cNvPr id="16" name="CuadroTexto 15">
+              <a:extLst>
+                <a:ext uri="{FF2B5EF4-FFF2-40B4-BE49-F238E27FC236}">
+                  <a16:creationId xmlns:a16="http://schemas.microsoft.com/office/drawing/2014/main" id="{19713EAB-5261-4665-91F7-2DFD19C8A273}"/>
+                </a:ext>
+              </a:extLst>
+            </p:cNvPr>
+            <p:cNvSpPr txBox="1"/>
+            <p:nvPr/>
+          </p:nvSpPr>
+          <p:spPr>
+            <a:xfrm>
+              <a:off x="8851782" y="2520917"/>
+              <a:ext cx="267051" cy="307777"/>
+            </a:xfrm>
+            <a:prstGeom prst="rect">
+              <a:avLst/>
+            </a:prstGeom>
+            <a:solidFill>
+              <a:schemeClr val="bg1">
+                <a:lumMod val="85000"/>
+              </a:schemeClr>
+            </a:solidFill>
+            <a:ln>
+              <a:solidFill>
+                <a:schemeClr val="tx1"/>
+              </a:solidFill>
+            </a:ln>
+          </p:spPr>
+          <p:txBody>
+            <a:bodyPr wrap="square" rtlCol="0">
+              <a:spAutoFit/>
+            </a:bodyPr>
+            <a:lstStyle/>
+            <a:p>
+              <a:pPr algn="ctr"/>
+              <a:r>
+                <a:rPr lang="es-ES" sz="1400" dirty="0"/>
+                <a:t>+</a:t>
+              </a:r>
+            </a:p>
+          </p:txBody>
+        </p:sp>
+        <p:sp>
+          <p:nvSpPr>
+            <p:cNvPr id="17" name="CuadroTexto 16">
+              <a:extLst>
+                <a:ext uri="{FF2B5EF4-FFF2-40B4-BE49-F238E27FC236}">
+                  <a16:creationId xmlns:a16="http://schemas.microsoft.com/office/drawing/2014/main" id="{F98C1302-45BF-449D-BD36-6743087E2F05}"/>
+                </a:ext>
+              </a:extLst>
+            </p:cNvPr>
+            <p:cNvSpPr txBox="1"/>
+            <p:nvPr/>
+          </p:nvSpPr>
+          <p:spPr>
+            <a:xfrm>
+              <a:off x="8851781" y="2828694"/>
+              <a:ext cx="267051" cy="307777"/>
+            </a:xfrm>
+            <a:prstGeom prst="rect">
+              <a:avLst/>
+            </a:prstGeom>
+            <a:solidFill>
+              <a:schemeClr val="bg1">
+                <a:lumMod val="85000"/>
+              </a:schemeClr>
+            </a:solidFill>
+            <a:ln>
+              <a:solidFill>
+                <a:schemeClr val="tx1"/>
+              </a:solidFill>
+            </a:ln>
+          </p:spPr>
+          <p:txBody>
+            <a:bodyPr wrap="square" rtlCol="0">
+              <a:spAutoFit/>
+            </a:bodyPr>
+            <a:lstStyle/>
+            <a:p>
+              <a:pPr algn="ctr"/>
+              <a:r>
+                <a:rPr lang="es-ES" sz="1400" dirty="0"/>
+                <a:t>-</a:t>
+              </a:r>
+            </a:p>
+          </p:txBody>
+        </p:sp>
+      </p:grpSp>
+      <p:sp>
+        <p:nvSpPr>
+          <p:cNvPr id="2" name="CuadroTexto 1">
+            <a:extLst>
+              <a:ext uri="{FF2B5EF4-FFF2-40B4-BE49-F238E27FC236}">
+                <a16:creationId xmlns:a16="http://schemas.microsoft.com/office/drawing/2014/main" id="{13EBE1A3-05B8-4CBB-94EE-98EFCC3BCE00}"/>
+              </a:ext>
+            </a:extLst>
+          </p:cNvPr>
+          <p:cNvSpPr txBox="1"/>
+          <p:nvPr/>
+        </p:nvSpPr>
+        <p:spPr>
+          <a:xfrm>
+            <a:off x="8516025" y="2635002"/>
+            <a:ext cx="2201663" cy="923330"/>
+          </a:xfrm>
+          <a:prstGeom prst="rect">
+            <a:avLst/>
+          </a:prstGeom>
+          <a:noFill/>
+          <a:ln w="6350">
+            <a:solidFill>
+              <a:schemeClr val="tx1"/>
+            </a:solidFill>
+          </a:ln>
+        </p:spPr>
+        <p:txBody>
+          <a:bodyPr wrap="square" rtlCol="0">
+            <a:spAutoFit/>
+          </a:bodyPr>
+          <a:lstStyle/>
+          <a:p>
+            <a:r>
+              <a:rPr lang="es-ES" dirty="0"/>
+              <a:t>Total </a:t>
+            </a:r>
+            <a:r>
+              <a:rPr lang="es-ES" dirty="0" err="1"/>
+              <a:t>distance</a:t>
+            </a:r>
+            <a:endParaRPr lang="es-ES" dirty="0"/>
+          </a:p>
+          <a:p>
+            <a:r>
+              <a:rPr lang="es-ES" dirty="0" err="1"/>
+              <a:t>Uphill</a:t>
+            </a:r>
+            <a:r>
+              <a:rPr lang="es-ES" dirty="0"/>
+              <a:t> </a:t>
+            </a:r>
+            <a:r>
+              <a:rPr lang="es-ES" dirty="0" err="1"/>
+              <a:t>elevation</a:t>
+            </a:r>
+            <a:endParaRPr lang="es-ES" dirty="0"/>
+          </a:p>
+          <a:p>
+            <a:r>
+              <a:rPr lang="es-ES" dirty="0" err="1"/>
+              <a:t>Downhill</a:t>
+            </a:r>
+            <a:r>
+              <a:rPr lang="es-ES" dirty="0"/>
+              <a:t> </a:t>
+            </a:r>
+            <a:r>
+              <a:rPr lang="es-ES" dirty="0" err="1"/>
+              <a:t>elevation</a:t>
+            </a:r>
+            <a:endParaRPr lang="es-ES" dirty="0"/>
+          </a:p>
+        </p:txBody>
+      </p:sp>
+      <p:sp>
+        <p:nvSpPr>
+          <p:cNvPr id="19" name="CuadroTexto 18">
+            <a:extLst>
+              <a:ext uri="{FF2B5EF4-FFF2-40B4-BE49-F238E27FC236}">
+                <a16:creationId xmlns:a16="http://schemas.microsoft.com/office/drawing/2014/main" id="{D6388275-7A37-4C1C-AEE0-BCB3DB9E4552}"/>
+              </a:ext>
+            </a:extLst>
+          </p:cNvPr>
+          <p:cNvSpPr txBox="1"/>
+          <p:nvPr/>
+        </p:nvSpPr>
+        <p:spPr>
+          <a:xfrm>
+            <a:off x="1623235" y="617377"/>
+            <a:ext cx="964734" cy="369332"/>
+          </a:xfrm>
+          <a:prstGeom prst="rect">
+            <a:avLst/>
+          </a:prstGeom>
+          <a:solidFill>
+            <a:schemeClr val="bg1">
+              <a:lumMod val="75000"/>
+            </a:schemeClr>
+          </a:solidFill>
+          <a:ln>
+            <a:solidFill>
+              <a:schemeClr val="tx1"/>
+            </a:solidFill>
+          </a:ln>
+        </p:spPr>
+        <p:txBody>
+          <a:bodyPr wrap="square" rtlCol="0">
+            <a:spAutoFit/>
+          </a:bodyPr>
+          <a:lstStyle/>
+          <a:p>
+            <a:r>
+              <a:rPr lang="es-ES" dirty="0" err="1"/>
+              <a:t>Edit</a:t>
+            </a:r>
+            <a:endParaRPr lang="es-ES" dirty="0"/>
+          </a:p>
+        </p:txBody>
+      </p:sp>
+      <p:sp>
+        <p:nvSpPr>
+          <p:cNvPr id="20" name="CuadroTexto 19">
+            <a:extLst>
+              <a:ext uri="{FF2B5EF4-FFF2-40B4-BE49-F238E27FC236}">
+                <a16:creationId xmlns:a16="http://schemas.microsoft.com/office/drawing/2014/main" id="{0C264CB2-A6FA-4E6B-AE91-CFBA18F78ADA}"/>
+              </a:ext>
+            </a:extLst>
+          </p:cNvPr>
+          <p:cNvSpPr txBox="1"/>
+          <p:nvPr/>
+        </p:nvSpPr>
+        <p:spPr>
+          <a:xfrm>
+            <a:off x="1774235" y="986709"/>
+            <a:ext cx="1325461" cy="307777"/>
+          </a:xfrm>
+          <a:prstGeom prst="rect">
+            <a:avLst/>
+          </a:prstGeom>
+          <a:solidFill>
+            <a:schemeClr val="bg1">
+              <a:lumMod val="75000"/>
+            </a:schemeClr>
+          </a:solidFill>
+          <a:ln>
+            <a:solidFill>
+              <a:schemeClr val="tx1"/>
+            </a:solidFill>
+          </a:ln>
+        </p:spPr>
+        <p:txBody>
+          <a:bodyPr wrap="square" rtlCol="0">
+            <a:spAutoFit/>
+          </a:bodyPr>
+          <a:lstStyle/>
+          <a:p>
+            <a:r>
+              <a:rPr lang="es-ES" sz="1400" dirty="0" err="1"/>
+              <a:t>Cut</a:t>
+            </a:r>
+            <a:endParaRPr lang="es-ES" sz="1400" dirty="0"/>
+          </a:p>
+        </p:txBody>
+      </p:sp>
+      <p:sp>
+        <p:nvSpPr>
+          <p:cNvPr id="21" name="CuadroTexto 20">
+            <a:extLst>
+              <a:ext uri="{FF2B5EF4-FFF2-40B4-BE49-F238E27FC236}">
+                <a16:creationId xmlns:a16="http://schemas.microsoft.com/office/drawing/2014/main" id="{F8151BB7-52B9-4035-A738-BD140D5D48F6}"/>
+              </a:ext>
+            </a:extLst>
+          </p:cNvPr>
+          <p:cNvSpPr txBox="1"/>
+          <p:nvPr/>
+        </p:nvSpPr>
+        <p:spPr>
+          <a:xfrm>
+            <a:off x="1774234" y="1294486"/>
+            <a:ext cx="1325461" cy="307777"/>
+          </a:xfrm>
+          <a:prstGeom prst="rect">
+            <a:avLst/>
+          </a:prstGeom>
+          <a:solidFill>
+            <a:schemeClr val="bg1">
+              <a:lumMod val="75000"/>
+            </a:schemeClr>
+          </a:solidFill>
+          <a:ln>
+            <a:solidFill>
+              <a:schemeClr val="tx1"/>
+            </a:solidFill>
+          </a:ln>
+        </p:spPr>
+        <p:txBody>
+          <a:bodyPr wrap="square" rtlCol="0">
+            <a:spAutoFit/>
+          </a:bodyPr>
+          <a:lstStyle/>
+          <a:p>
+            <a:r>
+              <a:rPr lang="es-ES" sz="1400" dirty="0"/>
+              <a:t>Reverse</a:t>
+            </a:r>
+          </a:p>
+        </p:txBody>
+      </p:sp>
+      <p:sp>
+        <p:nvSpPr>
+          <p:cNvPr id="22" name="CuadroTexto 21">
+            <a:extLst>
+              <a:ext uri="{FF2B5EF4-FFF2-40B4-BE49-F238E27FC236}">
+                <a16:creationId xmlns:a16="http://schemas.microsoft.com/office/drawing/2014/main" id="{46F10B72-267E-4BFB-B14E-69572CFA8C21}"/>
+              </a:ext>
+            </a:extLst>
+          </p:cNvPr>
+          <p:cNvSpPr txBox="1"/>
+          <p:nvPr/>
+        </p:nvSpPr>
+        <p:spPr>
+          <a:xfrm>
+            <a:off x="1774234" y="1586903"/>
+            <a:ext cx="1325461" cy="307777"/>
+          </a:xfrm>
+          <a:prstGeom prst="rect">
+            <a:avLst/>
+          </a:prstGeom>
+          <a:solidFill>
+            <a:schemeClr val="bg1">
+              <a:lumMod val="75000"/>
+            </a:schemeClr>
+          </a:solidFill>
+          <a:ln>
+            <a:solidFill>
+              <a:schemeClr val="tx1"/>
+            </a:solidFill>
+          </a:ln>
+        </p:spPr>
+        <p:txBody>
+          <a:bodyPr wrap="square" rtlCol="0">
+            <a:spAutoFit/>
+          </a:bodyPr>
+          <a:lstStyle/>
+          <a:p>
+            <a:r>
+              <a:rPr lang="es-ES" sz="1400" dirty="0" err="1"/>
+              <a:t>Insert</a:t>
+            </a:r>
+            <a:r>
+              <a:rPr lang="es-ES" sz="1400" dirty="0"/>
+              <a:t> time</a:t>
+            </a:r>
+          </a:p>
+        </p:txBody>
+      </p:sp>
+      <p:sp>
+        <p:nvSpPr>
+          <p:cNvPr id="23" name="CuadroTexto 22">
+            <a:extLst>
+              <a:ext uri="{FF2B5EF4-FFF2-40B4-BE49-F238E27FC236}">
+                <a16:creationId xmlns:a16="http://schemas.microsoft.com/office/drawing/2014/main" id="{EAEA99F1-4674-46B3-9798-FADF21C40105}"/>
+              </a:ext>
+            </a:extLst>
+          </p:cNvPr>
+          <p:cNvSpPr txBox="1"/>
+          <p:nvPr/>
+        </p:nvSpPr>
+        <p:spPr>
+          <a:xfrm>
+            <a:off x="1774234" y="1897260"/>
+            <a:ext cx="1433568" cy="307777"/>
+          </a:xfrm>
+          <a:prstGeom prst="rect">
+            <a:avLst/>
+          </a:prstGeom>
+          <a:solidFill>
+            <a:schemeClr val="bg1">
+              <a:lumMod val="75000"/>
+            </a:schemeClr>
+          </a:solidFill>
+          <a:ln>
+            <a:solidFill>
+              <a:schemeClr val="tx1"/>
+            </a:solidFill>
+          </a:ln>
+        </p:spPr>
+        <p:txBody>
+          <a:bodyPr wrap="square" rtlCol="0">
+            <a:spAutoFit/>
+          </a:bodyPr>
+          <a:lstStyle/>
+          <a:p>
+            <a:r>
+              <a:rPr lang="es-ES" sz="1400" dirty="0" err="1"/>
+              <a:t>Correct</a:t>
+            </a:r>
+            <a:r>
+              <a:rPr lang="es-ES" sz="1400" dirty="0"/>
+              <a:t> </a:t>
+            </a:r>
+            <a:r>
+              <a:rPr lang="es-ES" sz="1400" dirty="0" err="1"/>
+              <a:t>elevation</a:t>
+            </a:r>
+            <a:endParaRPr lang="es-ES" sz="1400" dirty="0"/>
+          </a:p>
+        </p:txBody>
+      </p:sp>
+      <p:sp>
+        <p:nvSpPr>
+          <p:cNvPr id="24" name="CuadroTexto 23">
+            <a:extLst>
+              <a:ext uri="{FF2B5EF4-FFF2-40B4-BE49-F238E27FC236}">
+                <a16:creationId xmlns:a16="http://schemas.microsoft.com/office/drawing/2014/main" id="{8ADFD561-D90E-4185-8F9E-2A01AB69B558}"/>
+              </a:ext>
+            </a:extLst>
+          </p:cNvPr>
+          <p:cNvSpPr txBox="1"/>
+          <p:nvPr/>
+        </p:nvSpPr>
+        <p:spPr>
+          <a:xfrm>
+            <a:off x="1774233" y="2205037"/>
+            <a:ext cx="1325461" cy="307777"/>
+          </a:xfrm>
+          <a:prstGeom prst="rect">
+            <a:avLst/>
+          </a:prstGeom>
+          <a:solidFill>
+            <a:schemeClr val="bg1">
+              <a:lumMod val="75000"/>
+            </a:schemeClr>
+          </a:solidFill>
+          <a:ln>
+            <a:solidFill>
+              <a:schemeClr val="tx1"/>
+            </a:solidFill>
+          </a:ln>
+        </p:spPr>
+        <p:txBody>
+          <a:bodyPr wrap="square" rtlCol="0">
+            <a:spAutoFit/>
+          </a:bodyPr>
+          <a:lstStyle/>
+          <a:p>
+            <a:r>
+              <a:rPr lang="es-ES" sz="1400" dirty="0"/>
+              <a:t>Split</a:t>
+            </a:r>
+          </a:p>
+        </p:txBody>
+      </p:sp>
+      <p:sp>
+        <p:nvSpPr>
+          <p:cNvPr id="26" name="CuadroTexto 25">
+            <a:extLst>
+              <a:ext uri="{FF2B5EF4-FFF2-40B4-BE49-F238E27FC236}">
+                <a16:creationId xmlns:a16="http://schemas.microsoft.com/office/drawing/2014/main" id="{A0084574-BA24-4B78-AB48-EF00E1F0B4C8}"/>
+              </a:ext>
+            </a:extLst>
+          </p:cNvPr>
+          <p:cNvSpPr txBox="1"/>
+          <p:nvPr/>
+        </p:nvSpPr>
+        <p:spPr>
+          <a:xfrm>
+            <a:off x="252818" y="2184564"/>
+            <a:ext cx="1325461" cy="307777"/>
+          </a:xfrm>
+          <a:prstGeom prst="rect">
+            <a:avLst/>
+          </a:prstGeom>
+          <a:solidFill>
+            <a:schemeClr val="bg1">
+              <a:lumMod val="75000"/>
+            </a:schemeClr>
+          </a:solidFill>
+          <a:ln>
+            <a:solidFill>
+              <a:schemeClr val="tx1"/>
+            </a:solidFill>
+          </a:ln>
+        </p:spPr>
+        <p:txBody>
+          <a:bodyPr wrap="square" rtlCol="0">
+            <a:spAutoFit/>
+          </a:bodyPr>
+          <a:lstStyle/>
+          <a:p>
+            <a:r>
+              <a:rPr lang="es-ES" sz="1400" dirty="0" err="1"/>
+              <a:t>Save</a:t>
+            </a:r>
+            <a:r>
+              <a:rPr lang="es-ES" sz="1400" dirty="0"/>
+              <a:t> </a:t>
+            </a:r>
+            <a:r>
+              <a:rPr lang="es-ES" sz="1400" dirty="0" err="1"/>
+              <a:t>gpx</a:t>
+            </a:r>
+            <a:endParaRPr lang="es-ES" sz="1400" dirty="0"/>
+          </a:p>
+        </p:txBody>
+      </p:sp>
+      <p:pic>
+        <p:nvPicPr>
+          <p:cNvPr id="27" name="Picture 2" descr="Rendered Image">
+            <a:extLst>
+              <a:ext uri="{FF2B5EF4-FFF2-40B4-BE49-F238E27FC236}">
+                <a16:creationId xmlns:a16="http://schemas.microsoft.com/office/drawing/2014/main" id="{2C75B870-AC7F-429D-AFC1-7A8EA53BE2AE}"/>
+              </a:ext>
+            </a:extLst>
+          </p:cNvPr>
+          <p:cNvPicPr>
+            <a:picLocks noChangeAspect="1" noChangeArrowheads="1"/>
+          </p:cNvPicPr>
+          <p:nvPr/>
+        </p:nvPicPr>
+        <p:blipFill>
+          <a:blip r:embed="rId4">
+            <a:extLst>
+              <a:ext uri="{28A0092B-C50C-407E-A947-70E740481C1C}">
+                <a14:useLocalDpi xmlns:a14="http://schemas.microsoft.com/office/drawing/2010/main" val="0"/>
+              </a:ext>
+            </a:extLst>
+          </a:blip>
+          <a:srcRect/>
+          <a:stretch>
+            <a:fillRect/>
+          </a:stretch>
+        </p:blipFill>
+        <p:spPr bwMode="auto">
+          <a:xfrm>
+            <a:off x="324331" y="5331161"/>
+            <a:ext cx="2181225" cy="809625"/>
+          </a:xfrm>
+          <a:prstGeom prst="rect">
+            <a:avLst/>
+          </a:prstGeom>
+          <a:noFill/>
+          <a:extLst>
+            <a:ext uri="{909E8E84-426E-40DD-AFC4-6F175D3DCCD1}">
+              <a14:hiddenFill xmlns:a14="http://schemas.microsoft.com/office/drawing/2010/main">
+                <a:solidFill>
+                  <a:srgbClr val="FFFFFF"/>
+                </a:solidFill>
+              </a14:hiddenFill>
+            </a:ext>
+          </a:extLst>
+        </p:spPr>
+      </p:pic>
+    </p:spTree>
+    <p:extLst>
+      <p:ext uri="{BB962C8B-B14F-4D97-AF65-F5344CB8AC3E}">
+        <p14:creationId xmlns:p14="http://schemas.microsoft.com/office/powerpoint/2010/main" val="120172584"/>
+      </p:ext>
+    </p:extLst>
+  </p:cSld>
+  <p:clrMapOvr>
+    <a:masterClrMapping/>
+  </p:clrMapOvr>
+</p:sld>
+</file>
+
+<file path=ppt/slides/slide13.xml><?xml version="1.0" encoding="utf-8"?>
+<p:sld xmlns:a="http://schemas.openxmlformats.org/drawingml/2006/main" xmlns:r="http://schemas.openxmlformats.org/officeDocument/2006/relationships" xmlns:p="http://schemas.openxmlformats.org/presentationml/2006/main">
+  <p:cSld>
+    <p:spTree>
+      <p:nvGrpSpPr>
+        <p:cNvPr id="1" name=""/>
+        <p:cNvGrpSpPr/>
+        <p:nvPr/>
+      </p:nvGrpSpPr>
+      <p:grpSpPr>
+        <a:xfrm>
+          <a:off x="0" y="0"/>
+          <a:ext cx="0" cy="0"/>
+          <a:chOff x="0" y="0"/>
+          <a:chExt cx="0" cy="0"/>
+        </a:xfrm>
+      </p:grpSpPr>
+      <p:pic>
+        <p:nvPicPr>
+          <p:cNvPr id="5" name="Imagen 4">
+            <a:extLst>
+              <a:ext uri="{FF2B5EF4-FFF2-40B4-BE49-F238E27FC236}">
+                <a16:creationId xmlns:a16="http://schemas.microsoft.com/office/drawing/2014/main" id="{20B84089-D466-4D04-9783-CB6ADAAD6C96}"/>
+              </a:ext>
+            </a:extLst>
+          </p:cNvPr>
+          <p:cNvPicPr>
+            <a:picLocks noChangeAspect="1"/>
+          </p:cNvPicPr>
+          <p:nvPr/>
+        </p:nvPicPr>
+        <p:blipFill>
+          <a:blip r:embed="rId2"/>
+          <a:stretch>
+            <a:fillRect/>
+          </a:stretch>
+        </p:blipFill>
+        <p:spPr>
+          <a:xfrm>
+            <a:off x="3318057" y="1193683"/>
+            <a:ext cx="5087713" cy="3562875"/>
+          </a:xfrm>
+          <a:prstGeom prst="rect">
+            <a:avLst/>
+          </a:prstGeom>
+        </p:spPr>
+      </p:pic>
+      <p:pic>
+        <p:nvPicPr>
+          <p:cNvPr id="6" name="Imagen 5">
+            <a:extLst>
+              <a:ext uri="{FF2B5EF4-FFF2-40B4-BE49-F238E27FC236}">
+                <a16:creationId xmlns:a16="http://schemas.microsoft.com/office/drawing/2014/main" id="{4A8A3EDD-413E-4611-B0F7-F3E7B0E8B4B8}"/>
+              </a:ext>
+            </a:extLst>
+          </p:cNvPr>
+          <p:cNvPicPr>
+            <a:picLocks noChangeAspect="1"/>
+          </p:cNvPicPr>
+          <p:nvPr/>
+        </p:nvPicPr>
+        <p:blipFill>
+          <a:blip r:embed="rId3"/>
+          <a:stretch>
+            <a:fillRect/>
+          </a:stretch>
+        </p:blipFill>
+        <p:spPr>
+          <a:xfrm>
+            <a:off x="3216217" y="4884598"/>
+            <a:ext cx="5332428" cy="1411427"/>
+          </a:xfrm>
+          <a:prstGeom prst="rect">
+            <a:avLst/>
+          </a:prstGeom>
+        </p:spPr>
+      </p:pic>
+      <p:sp>
+        <p:nvSpPr>
+          <p:cNvPr id="14" name="CuadroTexto 13">
+            <a:extLst>
+              <a:ext uri="{FF2B5EF4-FFF2-40B4-BE49-F238E27FC236}">
+                <a16:creationId xmlns:a16="http://schemas.microsoft.com/office/drawing/2014/main" id="{141CAC72-0D93-49C6-8913-A7593E1C4044}"/>
+              </a:ext>
+            </a:extLst>
+          </p:cNvPr>
+          <p:cNvSpPr txBox="1"/>
+          <p:nvPr/>
+        </p:nvSpPr>
+        <p:spPr>
+          <a:xfrm>
+            <a:off x="8783273" y="234892"/>
+            <a:ext cx="3087149" cy="1754326"/>
+          </a:xfrm>
+          <a:prstGeom prst="rect">
+            <a:avLst/>
+          </a:prstGeom>
+          <a:noFill/>
+        </p:spPr>
+        <p:txBody>
+          <a:bodyPr wrap="square" rtlCol="0">
+            <a:spAutoFit/>
+          </a:bodyPr>
+          <a:lstStyle/>
+          <a:p>
+            <a:r>
+              <a:rPr lang="es-ES" dirty="0"/>
+              <a:t>Notes:</a:t>
+            </a:r>
+          </a:p>
+          <a:p>
+            <a:pPr marL="285750" indent="-285750">
+              <a:buFontTx/>
+              <a:buChar char="-"/>
+            </a:pPr>
+            <a:r>
+              <a:rPr lang="es-ES" dirty="0"/>
+              <a:t>V01.00</a:t>
+            </a:r>
+          </a:p>
+          <a:p>
+            <a:pPr marL="285750" indent="-285750">
+              <a:buFontTx/>
+              <a:buChar char="-"/>
+            </a:pPr>
+            <a:r>
+              <a:rPr lang="es-ES" dirty="0" err="1"/>
+              <a:t>All</a:t>
+            </a:r>
+            <a:r>
+              <a:rPr lang="es-ES" dirty="0"/>
+              <a:t> file and </a:t>
+            </a:r>
+            <a:r>
+              <a:rPr lang="es-ES" dirty="0" err="1"/>
+              <a:t>edit</a:t>
+            </a:r>
+            <a:r>
+              <a:rPr lang="es-ES" dirty="0"/>
+              <a:t> </a:t>
+            </a:r>
+            <a:r>
+              <a:rPr lang="es-ES" dirty="0" err="1"/>
+              <a:t>menus</a:t>
+            </a:r>
+            <a:r>
+              <a:rPr lang="es-ES" dirty="0"/>
+              <a:t> </a:t>
+            </a:r>
+            <a:r>
+              <a:rPr lang="es-ES" dirty="0" err="1"/>
+              <a:t>working</a:t>
+            </a:r>
+            <a:endParaRPr lang="es-ES" dirty="0"/>
+          </a:p>
+          <a:p>
+            <a:pPr marL="285750" indent="-285750">
+              <a:buFontTx/>
+              <a:buChar char="-"/>
+            </a:pPr>
+            <a:r>
+              <a:rPr lang="es-ES" dirty="0" err="1"/>
+              <a:t>Unit</a:t>
+            </a:r>
+            <a:r>
+              <a:rPr lang="es-ES" dirty="0"/>
+              <a:t> </a:t>
+            </a:r>
+            <a:r>
+              <a:rPr lang="es-ES" dirty="0" err="1"/>
+              <a:t>tests</a:t>
+            </a:r>
+            <a:r>
+              <a:rPr lang="es-ES" dirty="0"/>
+              <a:t> </a:t>
+            </a:r>
+            <a:r>
+              <a:rPr lang="es-ES" dirty="0" err="1"/>
+              <a:t>updated</a:t>
+            </a:r>
+            <a:r>
+              <a:rPr lang="es-ES" dirty="0"/>
+              <a:t> and </a:t>
+            </a:r>
+            <a:r>
+              <a:rPr lang="es-ES" dirty="0" err="1"/>
+              <a:t>passed</a:t>
+            </a:r>
+            <a:r>
+              <a:rPr lang="es-ES" dirty="0"/>
+              <a:t> (</a:t>
+            </a:r>
+            <a:r>
+              <a:rPr lang="es-ES" dirty="0" err="1"/>
+              <a:t>or</a:t>
+            </a:r>
+            <a:r>
+              <a:rPr lang="es-ES" dirty="0"/>
+              <a:t> </a:t>
+            </a:r>
+            <a:r>
+              <a:rPr lang="es-ES" dirty="0" err="1"/>
+              <a:t>under</a:t>
+            </a:r>
+            <a:r>
+              <a:rPr lang="es-ES" dirty="0"/>
+              <a:t> control)</a:t>
+            </a:r>
           </a:p>
         </p:txBody>
       </p:sp>
@@ -5427,7 +7505,7 @@
         </p:nvSpPr>
         <p:spPr>
           <a:xfrm>
-            <a:off x="254252" y="2492167"/>
+            <a:off x="244727" y="2492167"/>
             <a:ext cx="1325461" cy="307777"/>
           </a:xfrm>
           <a:prstGeom prst="rect">
@@ -5751,7 +7829,7 @@
         </p:nvSpPr>
         <p:spPr>
           <a:xfrm>
-            <a:off x="253954" y="2184564"/>
+            <a:off x="244429" y="2184564"/>
             <a:ext cx="1325461" cy="307777"/>
           </a:xfrm>
           <a:prstGeom prst="rect">
@@ -5803,7 +7881,7 @@
 </p:sld>
 </file>
 
-<file path=ppt/slides/slide12.xml><?xml version="1.0" encoding="utf-8"?>
+<file path=ppt/slides/slide14.xml><?xml version="1.0" encoding="utf-8"?>
 <p:sld xmlns:a="http://schemas.openxmlformats.org/drawingml/2006/main" xmlns:r="http://schemas.openxmlformats.org/officeDocument/2006/relationships" xmlns:p="http://schemas.openxmlformats.org/presentationml/2006/main">
   <p:cSld>
     <p:spTree>
@@ -10411,7 +12489,7 @@
         <p:spPr>
           <a:xfrm>
             <a:off x="8548645" y="234892"/>
-            <a:ext cx="3556669" cy="2923877"/>
+            <a:ext cx="3556669" cy="3170099"/>
           </a:xfrm>
           <a:prstGeom prst="rect">
             <a:avLst/>
@@ -10629,6 +12707,16 @@
                 <a:cs typeface="Aharoni" panose="020B0604020202020204" pitchFamily="2" charset="-79"/>
               </a:rPr>
               <a:t>?</a:t>
+            </a:r>
+          </a:p>
+          <a:p>
+            <a:pPr marL="285750" indent="-285750">
+              <a:buFontTx/>
+              <a:buChar char="-"/>
+            </a:pPr>
+            <a:r>
+              <a:rPr lang="en-US" sz="1600" dirty="0"/>
+              <a:t>Add arrow to segments</a:t>
             </a:r>
           </a:p>
         </p:txBody>

</xml_diff>

<commit_message>
Fix elevation option implementation - Fix elevation by locating steep zone (threshold criteria) and use 3degree polynomial with n points around. - Warning SettingWithCopyWarning pending to be solved
</commit_message>
<xml_diff>
--- a/docs/gui_design.pptx
+++ b/docs/gui_design.pptx
@@ -326,7 +326,7 @@
           <a:p>
             <a:fld id="{B3E02414-0C21-4CC3-871B-2D6AD27EF3B6}" type="datetimeFigureOut">
               <a:rPr lang="es-ES" smtClean="0"/>
-              <a:t>17/10/2020</a:t>
+              <a:t>20/10/2020</a:t>
             </a:fld>
             <a:endParaRPr lang="es-ES"/>
           </a:p>
@@ -524,7 +524,7 @@
           <a:p>
             <a:fld id="{B3E02414-0C21-4CC3-871B-2D6AD27EF3B6}" type="datetimeFigureOut">
               <a:rPr lang="es-ES" smtClean="0"/>
-              <a:t>17/10/2020</a:t>
+              <a:t>20/10/2020</a:t>
             </a:fld>
             <a:endParaRPr lang="es-ES"/>
           </a:p>
@@ -732,7 +732,7 @@
           <a:p>
             <a:fld id="{B3E02414-0C21-4CC3-871B-2D6AD27EF3B6}" type="datetimeFigureOut">
               <a:rPr lang="es-ES" smtClean="0"/>
-              <a:t>17/10/2020</a:t>
+              <a:t>20/10/2020</a:t>
             </a:fld>
             <a:endParaRPr lang="es-ES"/>
           </a:p>
@@ -930,7 +930,7 @@
           <a:p>
             <a:fld id="{B3E02414-0C21-4CC3-871B-2D6AD27EF3B6}" type="datetimeFigureOut">
               <a:rPr lang="es-ES" smtClean="0"/>
-              <a:t>17/10/2020</a:t>
+              <a:t>20/10/2020</a:t>
             </a:fld>
             <a:endParaRPr lang="es-ES"/>
           </a:p>
@@ -1205,7 +1205,7 @@
           <a:p>
             <a:fld id="{B3E02414-0C21-4CC3-871B-2D6AD27EF3B6}" type="datetimeFigureOut">
               <a:rPr lang="es-ES" smtClean="0"/>
-              <a:t>17/10/2020</a:t>
+              <a:t>20/10/2020</a:t>
             </a:fld>
             <a:endParaRPr lang="es-ES"/>
           </a:p>
@@ -1470,7 +1470,7 @@
           <a:p>
             <a:fld id="{B3E02414-0C21-4CC3-871B-2D6AD27EF3B6}" type="datetimeFigureOut">
               <a:rPr lang="es-ES" smtClean="0"/>
-              <a:t>17/10/2020</a:t>
+              <a:t>20/10/2020</a:t>
             </a:fld>
             <a:endParaRPr lang="es-ES"/>
           </a:p>
@@ -1882,7 +1882,7 @@
           <a:p>
             <a:fld id="{B3E02414-0C21-4CC3-871B-2D6AD27EF3B6}" type="datetimeFigureOut">
               <a:rPr lang="es-ES" smtClean="0"/>
-              <a:t>17/10/2020</a:t>
+              <a:t>20/10/2020</a:t>
             </a:fld>
             <a:endParaRPr lang="es-ES"/>
           </a:p>
@@ -2023,7 +2023,7 @@
           <a:p>
             <a:fld id="{B3E02414-0C21-4CC3-871B-2D6AD27EF3B6}" type="datetimeFigureOut">
               <a:rPr lang="es-ES" smtClean="0"/>
-              <a:t>17/10/2020</a:t>
+              <a:t>20/10/2020</a:t>
             </a:fld>
             <a:endParaRPr lang="es-ES"/>
           </a:p>
@@ -2136,7 +2136,7 @@
           <a:p>
             <a:fld id="{B3E02414-0C21-4CC3-871B-2D6AD27EF3B6}" type="datetimeFigureOut">
               <a:rPr lang="es-ES" smtClean="0"/>
-              <a:t>17/10/2020</a:t>
+              <a:t>20/10/2020</a:t>
             </a:fld>
             <a:endParaRPr lang="es-ES"/>
           </a:p>
@@ -2447,7 +2447,7 @@
           <a:p>
             <a:fld id="{B3E02414-0C21-4CC3-871B-2D6AD27EF3B6}" type="datetimeFigureOut">
               <a:rPr lang="es-ES" smtClean="0"/>
-              <a:t>17/10/2020</a:t>
+              <a:t>20/10/2020</a:t>
             </a:fld>
             <a:endParaRPr lang="es-ES"/>
           </a:p>
@@ -2735,7 +2735,7 @@
           <a:p>
             <a:fld id="{B3E02414-0C21-4CC3-871B-2D6AD27EF3B6}" type="datetimeFigureOut">
               <a:rPr lang="es-ES" smtClean="0"/>
-              <a:t>17/10/2020</a:t>
+              <a:t>20/10/2020</a:t>
             </a:fld>
             <a:endParaRPr lang="es-ES"/>
           </a:p>
@@ -2976,7 +2976,7 @@
           <a:p>
             <a:fld id="{B3E02414-0C21-4CC3-871B-2D6AD27EF3B6}" type="datetimeFigureOut">
               <a:rPr lang="es-ES" smtClean="0"/>
-              <a:t>17/10/2020</a:t>
+              <a:t>20/10/2020</a:t>
             </a:fld>
             <a:endParaRPr lang="es-ES"/>
           </a:p>
@@ -5094,7 +5094,7 @@
         </p:nvSpPr>
         <p:spPr>
           <a:xfrm>
-            <a:off x="244727" y="2492167"/>
+            <a:off x="253116" y="2492167"/>
             <a:ext cx="1325461" cy="307777"/>
           </a:xfrm>
           <a:prstGeom prst="rect">
@@ -5140,7 +5140,7 @@
         <p:spPr>
           <a:xfrm>
             <a:off x="8783273" y="234892"/>
-            <a:ext cx="3087149" cy="2308324"/>
+            <a:ext cx="3087149" cy="2862322"/>
           </a:xfrm>
           <a:prstGeom prst="rect">
             <a:avLst/>
@@ -5177,6 +5177,14 @@
               <a:rPr lang="es-ES" dirty="0" err="1"/>
               <a:t>Cut</a:t>
             </a:r>
+            <a:r>
+              <a:rPr lang="es-ES" dirty="0"/>
+              <a:t>/</a:t>
+            </a:r>
+            <a:r>
+              <a:rPr lang="es-ES" dirty="0" err="1"/>
+              <a:t>Remove</a:t>
+            </a:r>
             <a:endParaRPr lang="es-ES" dirty="0"/>
           </a:p>
           <a:p>
@@ -5240,7 +5248,104 @@
               <a:rPr lang="es-ES" dirty="0" err="1"/>
               <a:t>elevation</a:t>
             </a:r>
+            <a:r>
+              <a:rPr lang="es-ES" dirty="0"/>
+              <a:t> </a:t>
+            </a:r>
+            <a:r>
+              <a:rPr lang="en-US" dirty="0"/>
+              <a:t>✔</a:t>
+            </a:r>
             <a:endParaRPr lang="es-ES" dirty="0"/>
+          </a:p>
+          <a:p>
+            <a:pPr marL="285750" indent="-285750">
+              <a:buFontTx/>
+              <a:buChar char="-"/>
+            </a:pPr>
+            <a:r>
+              <a:rPr lang="es-ES" dirty="0" err="1">
+                <a:solidFill>
+                  <a:schemeClr val="bg1">
+                    <a:lumMod val="65000"/>
+                  </a:schemeClr>
+                </a:solidFill>
+              </a:rPr>
+              <a:t>Segments</a:t>
+            </a:r>
+            <a:r>
+              <a:rPr lang="es-ES" dirty="0">
+                <a:solidFill>
+                  <a:schemeClr val="bg1">
+                    <a:lumMod val="65000"/>
+                  </a:schemeClr>
+                </a:solidFill>
+              </a:rPr>
+              <a:t> </a:t>
+            </a:r>
+            <a:r>
+              <a:rPr lang="es-ES" dirty="0" err="1">
+                <a:solidFill>
+                  <a:schemeClr val="bg1">
+                    <a:lumMod val="65000"/>
+                  </a:schemeClr>
+                </a:solidFill>
+              </a:rPr>
+              <a:t>order</a:t>
+            </a:r>
+            <a:endParaRPr lang="es-ES" dirty="0">
+              <a:solidFill>
+                <a:schemeClr val="bg1">
+                  <a:lumMod val="65000"/>
+                </a:schemeClr>
+              </a:solidFill>
+            </a:endParaRPr>
+          </a:p>
+          <a:p>
+            <a:pPr marL="285750" indent="-285750">
+              <a:buFontTx/>
+              <a:buChar char="-"/>
+            </a:pPr>
+            <a:r>
+              <a:rPr lang="es-ES" dirty="0" err="1">
+                <a:solidFill>
+                  <a:schemeClr val="bg1">
+                    <a:lumMod val="65000"/>
+                  </a:schemeClr>
+                </a:solidFill>
+              </a:rPr>
+              <a:t>Track</a:t>
+            </a:r>
+            <a:r>
+              <a:rPr lang="es-ES" dirty="0">
+                <a:solidFill>
+                  <a:schemeClr val="bg1">
+                    <a:lumMod val="65000"/>
+                  </a:schemeClr>
+                </a:solidFill>
+              </a:rPr>
+              <a:t> time in </a:t>
+            </a:r>
+            <a:r>
+              <a:rPr lang="es-ES" dirty="0" err="1">
+                <a:solidFill>
+                  <a:schemeClr val="bg1">
+                    <a:lumMod val="65000"/>
+                  </a:schemeClr>
+                </a:solidFill>
+              </a:rPr>
+              <a:t>info</a:t>
+            </a:r>
+            <a:r>
+              <a:rPr lang="es-ES" dirty="0">
+                <a:solidFill>
+                  <a:schemeClr val="bg1">
+                    <a:lumMod val="65000"/>
+                  </a:schemeClr>
+                </a:solidFill>
+              </a:rPr>
+              <a:t> table</a:t>
+            </a:r>
           </a:p>
           <a:p>
             <a:endParaRPr lang="es-ES" dirty="0"/>
@@ -5651,7 +5756,7 @@
         </p:nvSpPr>
         <p:spPr>
           <a:xfrm>
-            <a:off x="244429" y="2184564"/>
+            <a:off x="252818" y="2184564"/>
             <a:ext cx="1325461" cy="307777"/>
           </a:xfrm>
           <a:prstGeom prst="rect">
@@ -5737,6 +5842,123 @@
           </a:extLst>
         </p:spPr>
       </p:pic>
+      <p:sp>
+        <p:nvSpPr>
+          <p:cNvPr id="2" name="CuadroTexto 1">
+            <a:extLst>
+              <a:ext uri="{FF2B5EF4-FFF2-40B4-BE49-F238E27FC236}">
+                <a16:creationId xmlns:a16="http://schemas.microsoft.com/office/drawing/2014/main" id="{499A0565-7F65-443F-8B76-6DD17AED528B}"/>
+              </a:ext>
+            </a:extLst>
+          </p:cNvPr>
+          <p:cNvSpPr txBox="1"/>
+          <p:nvPr/>
+        </p:nvSpPr>
+        <p:spPr>
+          <a:xfrm>
+            <a:off x="8516025" y="3020085"/>
+            <a:ext cx="2201663" cy="1200329"/>
+          </a:xfrm>
+          <a:prstGeom prst="rect">
+            <a:avLst/>
+          </a:prstGeom>
+          <a:noFill/>
+          <a:ln w="6350">
+            <a:solidFill>
+              <a:schemeClr val="tx1"/>
+            </a:solidFill>
+          </a:ln>
+        </p:spPr>
+        <p:txBody>
+          <a:bodyPr wrap="square" rtlCol="0">
+            <a:spAutoFit/>
+          </a:bodyPr>
+          <a:lstStyle/>
+          <a:p>
+            <a:r>
+              <a:rPr lang="es-ES" dirty="0"/>
+              <a:t>Total </a:t>
+            </a:r>
+            <a:r>
+              <a:rPr lang="es-ES" dirty="0" err="1"/>
+              <a:t>distance</a:t>
+            </a:r>
+            <a:endParaRPr lang="es-ES" dirty="0"/>
+          </a:p>
+          <a:p>
+            <a:r>
+              <a:rPr lang="es-ES" dirty="0" err="1"/>
+              <a:t>Uphill</a:t>
+            </a:r>
+            <a:r>
+              <a:rPr lang="es-ES" dirty="0"/>
+              <a:t> </a:t>
+            </a:r>
+            <a:r>
+              <a:rPr lang="es-ES" dirty="0" err="1"/>
+              <a:t>elevation</a:t>
+            </a:r>
+            <a:endParaRPr lang="es-ES" dirty="0"/>
+          </a:p>
+          <a:p>
+            <a:r>
+              <a:rPr lang="es-ES" dirty="0" err="1"/>
+              <a:t>Downhill</a:t>
+            </a:r>
+            <a:r>
+              <a:rPr lang="es-ES" dirty="0"/>
+              <a:t> </a:t>
+            </a:r>
+            <a:r>
+              <a:rPr lang="es-ES" dirty="0" err="1"/>
+              <a:t>elevation</a:t>
+            </a:r>
+            <a:endParaRPr lang="es-ES" dirty="0"/>
+          </a:p>
+          <a:p>
+            <a:r>
+              <a:rPr lang="es-ES" dirty="0" err="1">
+                <a:solidFill>
+                  <a:schemeClr val="bg1">
+                    <a:lumMod val="65000"/>
+                  </a:schemeClr>
+                </a:solidFill>
+              </a:rPr>
+              <a:t>Start</a:t>
+            </a:r>
+            <a:r>
+              <a:rPr lang="es-ES" dirty="0">
+                <a:solidFill>
+                  <a:schemeClr val="bg1">
+                    <a:lumMod val="65000"/>
+                  </a:schemeClr>
+                </a:solidFill>
+              </a:rPr>
+              <a:t>/</a:t>
+            </a:r>
+            <a:r>
+              <a:rPr lang="es-ES" dirty="0" err="1">
+                <a:solidFill>
+                  <a:schemeClr val="bg1">
+                    <a:lumMod val="65000"/>
+                  </a:schemeClr>
+                </a:solidFill>
+              </a:rPr>
+              <a:t>end</a:t>
+            </a:r>
+            <a:r>
+              <a:rPr lang="es-ES" dirty="0">
+                <a:solidFill>
+                  <a:schemeClr val="bg1">
+                    <a:lumMod val="65000"/>
+                  </a:schemeClr>
+                </a:solidFill>
+              </a:rPr>
+              <a:t> Time</a:t>
+            </a:r>
+          </a:p>
+        </p:txBody>
+      </p:sp>
     </p:spTree>
     <p:extLst>
       <p:ext uri="{BB962C8B-B14F-4D97-AF65-F5344CB8AC3E}">
@@ -7505,7 +7727,7 @@
         </p:nvSpPr>
         <p:spPr>
           <a:xfrm>
-            <a:off x="244727" y="2492167"/>
+            <a:off x="253116" y="2492167"/>
             <a:ext cx="1325461" cy="307777"/>
           </a:xfrm>
           <a:prstGeom prst="rect">
@@ -7829,7 +8051,7 @@
         </p:nvSpPr>
         <p:spPr>
           <a:xfrm>
-            <a:off x="244429" y="2184564"/>
+            <a:off x="252818" y="2184564"/>
             <a:ext cx="1325461" cy="307777"/>
           </a:xfrm>
           <a:prstGeom prst="rect">

</xml_diff>

<commit_message>
Update design for V0.9
</commit_message>
<xml_diff>
--- a/docs/gui_design.pptx
+++ b/docs/gui_design.pptx
@@ -326,7 +326,7 @@
           <a:p>
             <a:fld id="{B3E02414-0C21-4CC3-871B-2D6AD27EF3B6}" type="datetimeFigureOut">
               <a:rPr lang="es-ES" smtClean="0"/>
-              <a:t>20/10/2020</a:t>
+              <a:t>13/01/2021</a:t>
             </a:fld>
             <a:endParaRPr lang="es-ES"/>
           </a:p>
@@ -524,7 +524,7 @@
           <a:p>
             <a:fld id="{B3E02414-0C21-4CC3-871B-2D6AD27EF3B6}" type="datetimeFigureOut">
               <a:rPr lang="es-ES" smtClean="0"/>
-              <a:t>20/10/2020</a:t>
+              <a:t>13/01/2021</a:t>
             </a:fld>
             <a:endParaRPr lang="es-ES"/>
           </a:p>
@@ -732,7 +732,7 @@
           <a:p>
             <a:fld id="{B3E02414-0C21-4CC3-871B-2D6AD27EF3B6}" type="datetimeFigureOut">
               <a:rPr lang="es-ES" smtClean="0"/>
-              <a:t>20/10/2020</a:t>
+              <a:t>13/01/2021</a:t>
             </a:fld>
             <a:endParaRPr lang="es-ES"/>
           </a:p>
@@ -930,7 +930,7 @@
           <a:p>
             <a:fld id="{B3E02414-0C21-4CC3-871B-2D6AD27EF3B6}" type="datetimeFigureOut">
               <a:rPr lang="es-ES" smtClean="0"/>
-              <a:t>20/10/2020</a:t>
+              <a:t>13/01/2021</a:t>
             </a:fld>
             <a:endParaRPr lang="es-ES"/>
           </a:p>
@@ -1205,7 +1205,7 @@
           <a:p>
             <a:fld id="{B3E02414-0C21-4CC3-871B-2D6AD27EF3B6}" type="datetimeFigureOut">
               <a:rPr lang="es-ES" smtClean="0"/>
-              <a:t>20/10/2020</a:t>
+              <a:t>13/01/2021</a:t>
             </a:fld>
             <a:endParaRPr lang="es-ES"/>
           </a:p>
@@ -1470,7 +1470,7 @@
           <a:p>
             <a:fld id="{B3E02414-0C21-4CC3-871B-2D6AD27EF3B6}" type="datetimeFigureOut">
               <a:rPr lang="es-ES" smtClean="0"/>
-              <a:t>20/10/2020</a:t>
+              <a:t>13/01/2021</a:t>
             </a:fld>
             <a:endParaRPr lang="es-ES"/>
           </a:p>
@@ -1882,7 +1882,7 @@
           <a:p>
             <a:fld id="{B3E02414-0C21-4CC3-871B-2D6AD27EF3B6}" type="datetimeFigureOut">
               <a:rPr lang="es-ES" smtClean="0"/>
-              <a:t>20/10/2020</a:t>
+              <a:t>13/01/2021</a:t>
             </a:fld>
             <a:endParaRPr lang="es-ES"/>
           </a:p>
@@ -2023,7 +2023,7 @@
           <a:p>
             <a:fld id="{B3E02414-0C21-4CC3-871B-2D6AD27EF3B6}" type="datetimeFigureOut">
               <a:rPr lang="es-ES" smtClean="0"/>
-              <a:t>20/10/2020</a:t>
+              <a:t>13/01/2021</a:t>
             </a:fld>
             <a:endParaRPr lang="es-ES"/>
           </a:p>
@@ -2136,7 +2136,7 @@
           <a:p>
             <a:fld id="{B3E02414-0C21-4CC3-871B-2D6AD27EF3B6}" type="datetimeFigureOut">
               <a:rPr lang="es-ES" smtClean="0"/>
-              <a:t>20/10/2020</a:t>
+              <a:t>13/01/2021</a:t>
             </a:fld>
             <a:endParaRPr lang="es-ES"/>
           </a:p>
@@ -2447,7 +2447,7 @@
           <a:p>
             <a:fld id="{B3E02414-0C21-4CC3-871B-2D6AD27EF3B6}" type="datetimeFigureOut">
               <a:rPr lang="es-ES" smtClean="0"/>
-              <a:t>20/10/2020</a:t>
+              <a:t>13/01/2021</a:t>
             </a:fld>
             <a:endParaRPr lang="es-ES"/>
           </a:p>
@@ -2735,7 +2735,7 @@
           <a:p>
             <a:fld id="{B3E02414-0C21-4CC3-871B-2D6AD27EF3B6}" type="datetimeFigureOut">
               <a:rPr lang="es-ES" smtClean="0"/>
-              <a:t>20/10/2020</a:t>
+              <a:t>13/01/2021</a:t>
             </a:fld>
             <a:endParaRPr lang="es-ES"/>
           </a:p>
@@ -2976,7 +2976,7 @@
           <a:p>
             <a:fld id="{B3E02414-0C21-4CC3-871B-2D6AD27EF3B6}" type="datetimeFigureOut">
               <a:rPr lang="es-ES" smtClean="0"/>
-              <a:t>20/10/2020</a:t>
+              <a:t>13/01/2021</a:t>
             </a:fld>
             <a:endParaRPr lang="es-ES"/>
           </a:p>
@@ -5175,15 +5175,15 @@
             </a:pPr>
             <a:r>
               <a:rPr lang="es-ES" dirty="0" err="1"/>
-              <a:t>Cut</a:t>
+              <a:t>Remove</a:t>
             </a:r>
             <a:r>
               <a:rPr lang="es-ES" dirty="0"/>
-              <a:t>/</a:t>
-            </a:r>
-            <a:r>
-              <a:rPr lang="es-ES" dirty="0" err="1"/>
-              <a:t>Remove</a:t>
+              <a:t> </a:t>
+            </a:r>
+            <a:r>
+              <a:rPr lang="en-US" dirty="0"/>
+              <a:t>✔</a:t>
             </a:r>
             <a:endParaRPr lang="es-ES" dirty="0"/>
           </a:p>
@@ -5209,8 +5209,13 @@
             </a:pPr>
             <a:r>
               <a:rPr lang="es-ES" dirty="0"/>
-              <a:t>Split</a:t>
-            </a:r>
+              <a:t>Split </a:t>
+            </a:r>
+            <a:r>
+              <a:rPr lang="en-US" dirty="0"/>
+              <a:t>✔</a:t>
+            </a:r>
+            <a:endParaRPr lang="es-ES" dirty="0"/>
           </a:p>
           <a:p>
             <a:pPr marL="285750" indent="-285750">
@@ -5264,34 +5269,24 @@
               <a:buChar char="-"/>
             </a:pPr>
             <a:r>
-              <a:rPr lang="es-ES" dirty="0" err="1">
-                <a:solidFill>
-                  <a:schemeClr val="bg1">
-                    <a:lumMod val="65000"/>
-                  </a:schemeClr>
-                </a:solidFill>
-              </a:rPr>
+              <a:rPr lang="es-ES" dirty="0" err="1"/>
               <a:t>Segments</a:t>
             </a:r>
             <a:r>
-              <a:rPr lang="es-ES" dirty="0">
-                <a:solidFill>
-                  <a:schemeClr val="bg1">
-                    <a:lumMod val="65000"/>
-                  </a:schemeClr>
-                </a:solidFill>
-              </a:rPr>
+              <a:rPr lang="es-ES" dirty="0"/>
               <a:t> </a:t>
             </a:r>
             <a:r>
-              <a:rPr lang="es-ES" dirty="0" err="1">
-                <a:solidFill>
-                  <a:schemeClr val="bg1">
-                    <a:lumMod val="65000"/>
-                  </a:schemeClr>
-                </a:solidFill>
-              </a:rPr>
+              <a:rPr lang="es-ES" dirty="0" err="1"/>
               <a:t>order</a:t>
+            </a:r>
+            <a:r>
+              <a:rPr lang="es-ES" dirty="0"/>
+              <a:t> </a:t>
+            </a:r>
+            <a:r>
+              <a:rPr lang="en-US" dirty="0"/>
+              <a:t>✔</a:t>
             </a:r>
             <a:endParaRPr lang="es-ES" dirty="0">
               <a:solidFill>
@@ -5659,7 +5654,7 @@
         </p:nvSpPr>
         <p:spPr>
           <a:xfrm>
-            <a:off x="1774234" y="1897260"/>
+            <a:off x="1774234" y="1888382"/>
             <a:ext cx="1433568" cy="307777"/>
           </a:xfrm>
           <a:prstGeom prst="rect">
@@ -5712,7 +5707,7 @@
         </p:nvSpPr>
         <p:spPr>
           <a:xfrm>
-            <a:off x="1774233" y="2205037"/>
+            <a:off x="1774233" y="2196159"/>
             <a:ext cx="1325461" cy="307777"/>
           </a:xfrm>
           <a:prstGeom prst="rect">
@@ -5795,12 +5790,178 @@
           </a:p>
         </p:txBody>
       </p:sp>
+      <p:sp>
+        <p:nvSpPr>
+          <p:cNvPr id="2" name="CuadroTexto 1">
+            <a:extLst>
+              <a:ext uri="{FF2B5EF4-FFF2-40B4-BE49-F238E27FC236}">
+                <a16:creationId xmlns:a16="http://schemas.microsoft.com/office/drawing/2014/main" id="{499A0565-7F65-443F-8B76-6DD17AED528B}"/>
+              </a:ext>
+            </a:extLst>
+          </p:cNvPr>
+          <p:cNvSpPr txBox="1"/>
+          <p:nvPr/>
+        </p:nvSpPr>
+        <p:spPr>
+          <a:xfrm>
+            <a:off x="8516025" y="3020085"/>
+            <a:ext cx="2201663" cy="1200329"/>
+          </a:xfrm>
+          <a:prstGeom prst="rect">
+            <a:avLst/>
+          </a:prstGeom>
+          <a:noFill/>
+          <a:ln w="6350">
+            <a:solidFill>
+              <a:schemeClr val="tx1"/>
+            </a:solidFill>
+          </a:ln>
+        </p:spPr>
+        <p:txBody>
+          <a:bodyPr wrap="square" rtlCol="0">
+            <a:spAutoFit/>
+          </a:bodyPr>
+          <a:lstStyle/>
+          <a:p>
+            <a:r>
+              <a:rPr lang="es-ES" dirty="0"/>
+              <a:t>Total </a:t>
+            </a:r>
+            <a:r>
+              <a:rPr lang="es-ES" dirty="0" err="1"/>
+              <a:t>distance</a:t>
+            </a:r>
+            <a:endParaRPr lang="es-ES" dirty="0"/>
+          </a:p>
+          <a:p>
+            <a:r>
+              <a:rPr lang="es-ES" dirty="0" err="1"/>
+              <a:t>Uphill</a:t>
+            </a:r>
+            <a:r>
+              <a:rPr lang="es-ES" dirty="0"/>
+              <a:t> </a:t>
+            </a:r>
+            <a:r>
+              <a:rPr lang="es-ES" dirty="0" err="1"/>
+              <a:t>elevation</a:t>
+            </a:r>
+            <a:endParaRPr lang="es-ES" dirty="0"/>
+          </a:p>
+          <a:p>
+            <a:r>
+              <a:rPr lang="es-ES" dirty="0" err="1"/>
+              <a:t>Downhill</a:t>
+            </a:r>
+            <a:r>
+              <a:rPr lang="es-ES" dirty="0"/>
+              <a:t> </a:t>
+            </a:r>
+            <a:r>
+              <a:rPr lang="es-ES" dirty="0" err="1"/>
+              <a:t>elevation</a:t>
+            </a:r>
+            <a:endParaRPr lang="es-ES" dirty="0"/>
+          </a:p>
+          <a:p>
+            <a:r>
+              <a:rPr lang="es-ES" dirty="0" err="1">
+                <a:solidFill>
+                  <a:schemeClr val="bg1">
+                    <a:lumMod val="65000"/>
+                  </a:schemeClr>
+                </a:solidFill>
+              </a:rPr>
+              <a:t>Start</a:t>
+            </a:r>
+            <a:r>
+              <a:rPr lang="es-ES" dirty="0">
+                <a:solidFill>
+                  <a:schemeClr val="bg1">
+                    <a:lumMod val="65000"/>
+                  </a:schemeClr>
+                </a:solidFill>
+              </a:rPr>
+              <a:t>/</a:t>
+            </a:r>
+            <a:r>
+              <a:rPr lang="es-ES" dirty="0" err="1">
+                <a:solidFill>
+                  <a:schemeClr val="bg1">
+                    <a:lumMod val="65000"/>
+                  </a:schemeClr>
+                </a:solidFill>
+              </a:rPr>
+              <a:t>end</a:t>
+            </a:r>
+            <a:r>
+              <a:rPr lang="es-ES" dirty="0">
+                <a:solidFill>
+                  <a:schemeClr val="bg1">
+                    <a:lumMod val="65000"/>
+                  </a:schemeClr>
+                </a:solidFill>
+              </a:rPr>
+              <a:t> Time</a:t>
+            </a:r>
+          </a:p>
+        </p:txBody>
+      </p:sp>
+      <p:sp>
+        <p:nvSpPr>
+          <p:cNvPr id="25" name="CuadroTexto 24">
+            <a:extLst>
+              <a:ext uri="{FF2B5EF4-FFF2-40B4-BE49-F238E27FC236}">
+                <a16:creationId xmlns:a16="http://schemas.microsoft.com/office/drawing/2014/main" id="{C5514A1D-85BD-4413-899A-8072B806AAE4}"/>
+              </a:ext>
+            </a:extLst>
+          </p:cNvPr>
+          <p:cNvSpPr txBox="1"/>
+          <p:nvPr/>
+        </p:nvSpPr>
+        <p:spPr>
+          <a:xfrm>
+            <a:off x="1773935" y="2503936"/>
+            <a:ext cx="1325461" cy="307777"/>
+          </a:xfrm>
+          <a:prstGeom prst="rect">
+            <a:avLst/>
+          </a:prstGeom>
+          <a:solidFill>
+            <a:schemeClr val="bg1">
+              <a:lumMod val="75000"/>
+            </a:schemeClr>
+          </a:solidFill>
+          <a:ln>
+            <a:solidFill>
+              <a:schemeClr val="tx1"/>
+            </a:solidFill>
+          </a:ln>
+        </p:spPr>
+        <p:txBody>
+          <a:bodyPr wrap="square" rtlCol="0">
+            <a:spAutoFit/>
+          </a:bodyPr>
+          <a:lstStyle/>
+          <a:p>
+            <a:r>
+              <a:rPr lang="es-ES" sz="1400" dirty="0"/>
+              <a:t>Change </a:t>
+            </a:r>
+            <a:r>
+              <a:rPr lang="es-ES" sz="1400" dirty="0" err="1"/>
+              <a:t>order</a:t>
+            </a:r>
+            <a:endParaRPr lang="es-ES" sz="1400" dirty="0"/>
+          </a:p>
+        </p:txBody>
+      </p:sp>
       <p:pic>
         <p:nvPicPr>
-          <p:cNvPr id="27" name="Picture 2" descr="Rendered Image">
-            <a:extLst>
-              <a:ext uri="{FF2B5EF4-FFF2-40B4-BE49-F238E27FC236}">
-                <a16:creationId xmlns:a16="http://schemas.microsoft.com/office/drawing/2014/main" id="{BDEB4CBA-2856-4251-9CD5-4211BE3265F8}"/>
+          <p:cNvPr id="28" name="Picture 2" descr="Rendered Image">
+            <a:extLst>
+              <a:ext uri="{FF2B5EF4-FFF2-40B4-BE49-F238E27FC236}">
+                <a16:creationId xmlns:a16="http://schemas.microsoft.com/office/drawing/2014/main" id="{DD591393-9FE2-4A68-92FF-37C0E6EFDDCF}"/>
               </a:ext>
             </a:extLst>
           </p:cNvPr>
@@ -5824,8 +5985,8 @@
         </p:blipFill>
         <p:spPr bwMode="auto">
           <a:xfrm>
-            <a:off x="324331" y="5331161"/>
-            <a:ext cx="2181225" cy="809625"/>
+            <a:off x="598240" y="5134504"/>
+            <a:ext cx="2019300" cy="1057275"/>
           </a:xfrm>
           <a:prstGeom prst="rect">
             <a:avLst/>
@@ -5842,123 +6003,6 @@
           </a:extLst>
         </p:spPr>
       </p:pic>
-      <p:sp>
-        <p:nvSpPr>
-          <p:cNvPr id="2" name="CuadroTexto 1">
-            <a:extLst>
-              <a:ext uri="{FF2B5EF4-FFF2-40B4-BE49-F238E27FC236}">
-                <a16:creationId xmlns:a16="http://schemas.microsoft.com/office/drawing/2014/main" id="{499A0565-7F65-443F-8B76-6DD17AED528B}"/>
-              </a:ext>
-            </a:extLst>
-          </p:cNvPr>
-          <p:cNvSpPr txBox="1"/>
-          <p:nvPr/>
-        </p:nvSpPr>
-        <p:spPr>
-          <a:xfrm>
-            <a:off x="8516025" y="3020085"/>
-            <a:ext cx="2201663" cy="1200329"/>
-          </a:xfrm>
-          <a:prstGeom prst="rect">
-            <a:avLst/>
-          </a:prstGeom>
-          <a:noFill/>
-          <a:ln w="6350">
-            <a:solidFill>
-              <a:schemeClr val="tx1"/>
-            </a:solidFill>
-          </a:ln>
-        </p:spPr>
-        <p:txBody>
-          <a:bodyPr wrap="square" rtlCol="0">
-            <a:spAutoFit/>
-          </a:bodyPr>
-          <a:lstStyle/>
-          <a:p>
-            <a:r>
-              <a:rPr lang="es-ES" dirty="0"/>
-              <a:t>Total </a:t>
-            </a:r>
-            <a:r>
-              <a:rPr lang="es-ES" dirty="0" err="1"/>
-              <a:t>distance</a:t>
-            </a:r>
-            <a:endParaRPr lang="es-ES" dirty="0"/>
-          </a:p>
-          <a:p>
-            <a:r>
-              <a:rPr lang="es-ES" dirty="0" err="1"/>
-              <a:t>Uphill</a:t>
-            </a:r>
-            <a:r>
-              <a:rPr lang="es-ES" dirty="0"/>
-              <a:t> </a:t>
-            </a:r>
-            <a:r>
-              <a:rPr lang="es-ES" dirty="0" err="1"/>
-              <a:t>elevation</a:t>
-            </a:r>
-            <a:endParaRPr lang="es-ES" dirty="0"/>
-          </a:p>
-          <a:p>
-            <a:r>
-              <a:rPr lang="es-ES" dirty="0" err="1"/>
-              <a:t>Downhill</a:t>
-            </a:r>
-            <a:r>
-              <a:rPr lang="es-ES" dirty="0"/>
-              <a:t> </a:t>
-            </a:r>
-            <a:r>
-              <a:rPr lang="es-ES" dirty="0" err="1"/>
-              <a:t>elevation</a:t>
-            </a:r>
-            <a:endParaRPr lang="es-ES" dirty="0"/>
-          </a:p>
-          <a:p>
-            <a:r>
-              <a:rPr lang="es-ES" dirty="0" err="1">
-                <a:solidFill>
-                  <a:schemeClr val="bg1">
-                    <a:lumMod val="65000"/>
-                  </a:schemeClr>
-                </a:solidFill>
-              </a:rPr>
-              <a:t>Start</a:t>
-            </a:r>
-            <a:r>
-              <a:rPr lang="es-ES" dirty="0">
-                <a:solidFill>
-                  <a:schemeClr val="bg1">
-                    <a:lumMod val="65000"/>
-                  </a:schemeClr>
-                </a:solidFill>
-              </a:rPr>
-              <a:t>/</a:t>
-            </a:r>
-            <a:r>
-              <a:rPr lang="es-ES" dirty="0" err="1">
-                <a:solidFill>
-                  <a:schemeClr val="bg1">
-                    <a:lumMod val="65000"/>
-                  </a:schemeClr>
-                </a:solidFill>
-              </a:rPr>
-              <a:t>end</a:t>
-            </a:r>
-            <a:r>
-              <a:rPr lang="es-ES" dirty="0">
-                <a:solidFill>
-                  <a:schemeClr val="bg1">
-                    <a:lumMod val="65000"/>
-                  </a:schemeClr>
-                </a:solidFill>
-              </a:rPr>
-              <a:t> Time</a:t>
-            </a:r>
-          </a:p>
-        </p:txBody>
-      </p:sp>
     </p:spTree>
     <p:extLst>
       <p:ext uri="{BB962C8B-B14F-4D97-AF65-F5344CB8AC3E}">
@@ -6353,7 +6397,7 @@
         <p:spPr>
           <a:xfrm>
             <a:off x="8783273" y="234892"/>
-            <a:ext cx="3087149" cy="1754326"/>
+            <a:ext cx="3087149" cy="2031325"/>
           </a:xfrm>
           <a:prstGeom prst="rect">
             <a:avLst/>
@@ -6380,6 +6424,21 @@
               <a:rPr lang="es-ES" dirty="0"/>
               <a:t>V00.10</a:t>
             </a:r>
+          </a:p>
+          <a:p>
+            <a:pPr marL="285750" indent="-285750">
+              <a:buFontTx/>
+              <a:buChar char="-"/>
+            </a:pPr>
+            <a:r>
+              <a:rPr lang="es-ES" dirty="0"/>
+              <a:t>Bug </a:t>
+            </a:r>
+            <a:r>
+              <a:rPr lang="es-ES" dirty="0" err="1"/>
+              <a:t>corrections</a:t>
+            </a:r>
+            <a:endParaRPr lang="es-ES" dirty="0"/>
           </a:p>
           <a:p>
             <a:pPr marL="285750" indent="-285750">

</xml_diff>